<commit_message>
updated presentation and doc
</commit_message>
<xml_diff>
--- a/NilamHut.pptx
+++ b/NilamHut.pptx
@@ -5,10 +5,10 @@
     <p:sldMasterId id="2147483840" r:id="rId1"/>
   </p:sldMasterIdLst>
   <p:notesMasterIdLst>
-    <p:notesMasterId r:id="rId15"/>
+    <p:notesMasterId r:id="rId18"/>
   </p:notesMasterIdLst>
   <p:handoutMasterIdLst>
-    <p:handoutMasterId r:id="rId16"/>
+    <p:handoutMasterId r:id="rId19"/>
   </p:handoutMasterIdLst>
   <p:sldIdLst>
     <p:sldId id="256" r:id="rId2"/>
@@ -20,10 +20,13 @@
     <p:sldId id="271" r:id="rId8"/>
     <p:sldId id="272" r:id="rId9"/>
     <p:sldId id="275" r:id="rId10"/>
-    <p:sldId id="276" r:id="rId11"/>
-    <p:sldId id="277" r:id="rId12"/>
-    <p:sldId id="259" r:id="rId13"/>
-    <p:sldId id="266" r:id="rId14"/>
+    <p:sldId id="278" r:id="rId11"/>
+    <p:sldId id="280" r:id="rId12"/>
+    <p:sldId id="279" r:id="rId13"/>
+    <p:sldId id="276" r:id="rId14"/>
+    <p:sldId id="277" r:id="rId15"/>
+    <p:sldId id="259" r:id="rId16"/>
+    <p:sldId id="266" r:id="rId17"/>
   </p:sldIdLst>
   <p:sldSz cx="12192000" cy="6858000"/>
   <p:notesSz cx="6858000" cy="9144000"/>
@@ -3149,7 +3152,7 @@
           <a:p>
             <a:fld id="{DE71268B-8AC2-4239-8FAF-7C144C210720}" type="datetimeFigureOut">
               <a:rPr lang="en-US"/>
-              <a:t>10-Feb-18</a:t>
+              <a:t>2/12/2018</a:t>
             </a:fld>
             <a:endParaRPr/>
           </a:p>
@@ -3314,7 +3317,7 @@
           <a:p>
             <a:fld id="{F5AD8362-6D63-40AC-BAA9-90C3AE6D5875}" type="datetimeFigureOut">
               <a:rPr lang="en-US"/>
-              <a:t>10-Feb-18</a:t>
+              <a:t>2/12/2018</a:t>
             </a:fld>
             <a:endParaRPr/>
           </a:p>
@@ -4126,7 +4129,7 @@
           <a:p>
             <a:fld id="{5F4E5243-F52A-4D37-9694-EB26C6C31910}" type="datetime1">
               <a:rPr lang="en-US"/>
-              <a:t>10-Feb-18</a:t>
+              <a:t>2/12/2018</a:t>
             </a:fld>
             <a:endParaRPr/>
           </a:p>
@@ -4322,7 +4325,7 @@
           <a:p>
             <a:fld id="{3A77B6E1-634A-48DC-9E8B-D894023267EF}" type="datetime1">
               <a:rPr lang="en-US"/>
-              <a:t>10-Feb-18</a:t>
+              <a:t>2/12/2018</a:t>
             </a:fld>
             <a:endParaRPr/>
           </a:p>
@@ -4512,7 +4515,7 @@
           <a:p>
             <a:fld id="{7B2D3E9E-A95C-48F2-B4BF-A71542E0BE9A}" type="datetime1">
               <a:rPr lang="en-US"/>
-              <a:t>10-Feb-18</a:t>
+              <a:t>2/12/2018</a:t>
             </a:fld>
             <a:endParaRPr/>
           </a:p>
@@ -4843,7 +4846,7 @@
           <a:p>
             <a:fld id="{A50F84E2-2D7A-43CF-AC90-352A289A783A}" type="datetime1">
               <a:rPr lang="en-US"/>
-              <a:t>10-Feb-18</a:t>
+              <a:t>2/12/2018</a:t>
             </a:fld>
             <a:endParaRPr/>
           </a:p>
@@ -5151,7 +5154,7 @@
           <a:p>
             <a:fld id="{F12952B5-7A2F-4CC8-B7CE-9234E21C2837}" type="datetime1">
               <a:rPr lang="en-US"/>
-              <a:t>10-Feb-18</a:t>
+              <a:t>2/12/2018</a:t>
             </a:fld>
             <a:endParaRPr/>
           </a:p>
@@ -5599,7 +5602,7 @@
           <a:p>
             <a:fld id="{CE1DA07A-9201-4B4B-BAF2-015AFA30F520}" type="datetime1">
               <a:rPr lang="en-US"/>
-              <a:t>10-Feb-18</a:t>
+              <a:t>2/12/2018</a:t>
             </a:fld>
             <a:endParaRPr/>
           </a:p>
@@ -5733,7 +5736,7 @@
           <a:p>
             <a:fld id="{73D7E00A-486F-4252-8B1D-E32645521F49}" type="datetime1">
               <a:rPr lang="en-US"/>
-              <a:t>10-Feb-18</a:t>
+              <a:t>2/12/2018</a:t>
             </a:fld>
             <a:endParaRPr/>
           </a:p>
@@ -5906,7 +5909,7 @@
           <a:p>
             <a:fld id="{8DDF5F92-E675-4B36-9A60-69A962A68675}" type="datetime1">
               <a:rPr lang="en-US"/>
-              <a:t>10-Feb-18</a:t>
+              <a:t>2/12/2018</a:t>
             </a:fld>
             <a:endParaRPr/>
           </a:p>
@@ -6211,7 +6214,7 @@
           <a:p>
             <a:fld id="{AF6E2C9B-5FA2-460D-9BE7-B0812FC2A6FF}" type="datetime1">
               <a:rPr lang="en-US"/>
-              <a:t>10-Feb-18</a:t>
+              <a:t>2/12/2018</a:t>
             </a:fld>
             <a:endParaRPr/>
           </a:p>
@@ -6501,7 +6504,7 @@
           <a:p>
             <a:fld id="{1D374940-A916-4C8B-9648-02A2D3898F9E}" type="datetime1">
               <a:rPr lang="en-US"/>
-              <a:t>10-Feb-18</a:t>
+              <a:t>2/12/2018</a:t>
             </a:fld>
             <a:endParaRPr/>
           </a:p>
@@ -6948,7 +6951,7 @@
             <a:fld id="{5586B75A-687E-405C-8A0B-8D00578BA2C3}" type="datetime1">
               <a:rPr lang="en-US" smtClean="0"/>
               <a:pPr/>
-              <a:t>10-Feb-18</a:t>
+              <a:t>2/12/2018</a:t>
             </a:fld>
             <a:endParaRPr lang="en-US"/>
           </a:p>
@@ -7474,6 +7477,804 @@
       </p:grpSpPr>
       <p:sp>
         <p:nvSpPr>
+          <p:cNvPr id="4" name="Title 3"/>
+          <p:cNvSpPr>
+            <a:spLocks noGrp="1"/>
+          </p:cNvSpPr>
+          <p:nvPr>
+            <p:ph type="title"/>
+          </p:nvPr>
+        </p:nvSpPr>
+        <p:spPr/>
+        <p:txBody>
+          <a:bodyPr/>
+          <a:lstStyle/>
+          <a:p>
+            <a:pPr algn="ctr"/>
+            <a:r>
+              <a:rPr lang="en-US" dirty="0" smtClean="0"/>
+              <a:t>UML Diagram </a:t>
+            </a:r>
+            <a:r>
+              <a:rPr lang="en-US" dirty="0"/>
+              <a:t>(</a:t>
+            </a:r>
+            <a:r>
+              <a:rPr lang="en-US" sz="3400" dirty="0"/>
+              <a:t>Use Case</a:t>
+            </a:r>
+            <a:r>
+              <a:rPr lang="en-US" dirty="0"/>
+              <a:t>)</a:t>
+            </a:r>
+            <a:r>
+              <a:rPr lang="en-US" dirty="0" smtClean="0"/>
+              <a:t> For General User</a:t>
+            </a:r>
+            <a:endParaRPr lang="en-US" dirty="0"/>
+          </a:p>
+        </p:txBody>
+      </p:sp>
+      <p:pic>
+        <p:nvPicPr>
+          <p:cNvPr id="9" name="Content Placeholder 8"/>
+          <p:cNvPicPr>
+            <a:picLocks noGrp="1" noChangeAspect="1"/>
+          </p:cNvPicPr>
+          <p:nvPr>
+            <p:ph idx="1"/>
+          </p:nvPr>
+        </p:nvPicPr>
+        <p:blipFill>
+          <a:blip r:embed="rId2">
+            <a:extLst>
+              <a:ext uri="{28A0092B-C50C-407E-A947-70E740481C1C}">
+                <a14:useLocalDpi xmlns:a14="http://schemas.microsoft.com/office/drawing/2010/main" val="0"/>
+              </a:ext>
+            </a:extLst>
+          </a:blip>
+          <a:stretch>
+            <a:fillRect/>
+          </a:stretch>
+        </p:blipFill>
+        <p:spPr>
+          <a:xfrm>
+            <a:off x="2558788" y="1573213"/>
+            <a:ext cx="7074424" cy="4141787"/>
+          </a:xfrm>
+        </p:spPr>
+      </p:pic>
+    </p:spTree>
+    <p:extLst>
+      <p:ext uri="{BB962C8B-B14F-4D97-AF65-F5344CB8AC3E}">
+        <p14:creationId xmlns:p14="http://schemas.microsoft.com/office/powerpoint/2010/main" val="3003972170"/>
+      </p:ext>
+    </p:extLst>
+  </p:cSld>
+  <p:clrMapOvr>
+    <a:masterClrMapping/>
+  </p:clrMapOvr>
+  <mc:AlternateContent xmlns:mc="http://schemas.openxmlformats.org/markup-compatibility/2006">
+    <mc:Choice xmlns:p14="http://schemas.microsoft.com/office/powerpoint/2010/main" Requires="p14">
+      <p:transition spd="med" p14:dur="700">
+        <p:fade/>
+      </p:transition>
+    </mc:Choice>
+    <mc:Fallback>
+      <p:transition spd="med">
+        <p:fade/>
+      </p:transition>
+    </mc:Fallback>
+  </mc:AlternateContent>
+  <p:timing>
+    <p:tnLst>
+      <p:par>
+        <p:cTn id="1" dur="indefinite" restart="never" nodeType="tmRoot">
+          <p:childTnLst>
+            <p:seq concurrent="1" nextAc="seek">
+              <p:cTn id="2" dur="indefinite" nodeType="mainSeq">
+                <p:childTnLst>
+                  <p:par>
+                    <p:cTn id="3" fill="hold">
+                      <p:stCondLst>
+                        <p:cond delay="indefinite"/>
+                        <p:cond evt="onBegin" delay="0">
+                          <p:tn val="2"/>
+                        </p:cond>
+                      </p:stCondLst>
+                      <p:childTnLst>
+                        <p:par>
+                          <p:cTn id="4" fill="hold">
+                            <p:stCondLst>
+                              <p:cond delay="0"/>
+                            </p:stCondLst>
+                            <p:childTnLst>
+                              <p:par>
+                                <p:cTn id="5" presetID="31" presetClass="entr" presetSubtype="0" fill="hold" nodeType="withEffect">
+                                  <p:stCondLst>
+                                    <p:cond delay="0"/>
+                                  </p:stCondLst>
+                                  <p:childTnLst>
+                                    <p:set>
+                                      <p:cBhvr>
+                                        <p:cTn id="6" dur="1" fill="hold">
+                                          <p:stCondLst>
+                                            <p:cond delay="0"/>
+                                          </p:stCondLst>
+                                        </p:cTn>
+                                        <p:tgtEl>
+                                          <p:spTgt spid="9"/>
+                                        </p:tgtEl>
+                                        <p:attrNameLst>
+                                          <p:attrName>style.visibility</p:attrName>
+                                        </p:attrNameLst>
+                                      </p:cBhvr>
+                                      <p:to>
+                                        <p:strVal val="visible"/>
+                                      </p:to>
+                                    </p:set>
+                                    <p:anim calcmode="lin" valueType="num">
+                                      <p:cBhvr>
+                                        <p:cTn id="7" dur="1000" fill="hold"/>
+                                        <p:tgtEl>
+                                          <p:spTgt spid="9"/>
+                                        </p:tgtEl>
+                                        <p:attrNameLst>
+                                          <p:attrName>ppt_w</p:attrName>
+                                        </p:attrNameLst>
+                                      </p:cBhvr>
+                                      <p:tavLst>
+                                        <p:tav tm="0">
+                                          <p:val>
+                                            <p:fltVal val="0"/>
+                                          </p:val>
+                                        </p:tav>
+                                        <p:tav tm="100000">
+                                          <p:val>
+                                            <p:strVal val="#ppt_w"/>
+                                          </p:val>
+                                        </p:tav>
+                                      </p:tavLst>
+                                    </p:anim>
+                                    <p:anim calcmode="lin" valueType="num">
+                                      <p:cBhvr>
+                                        <p:cTn id="8" dur="1000" fill="hold"/>
+                                        <p:tgtEl>
+                                          <p:spTgt spid="9"/>
+                                        </p:tgtEl>
+                                        <p:attrNameLst>
+                                          <p:attrName>ppt_h</p:attrName>
+                                        </p:attrNameLst>
+                                      </p:cBhvr>
+                                      <p:tavLst>
+                                        <p:tav tm="0">
+                                          <p:val>
+                                            <p:fltVal val="0"/>
+                                          </p:val>
+                                        </p:tav>
+                                        <p:tav tm="100000">
+                                          <p:val>
+                                            <p:strVal val="#ppt_h"/>
+                                          </p:val>
+                                        </p:tav>
+                                      </p:tavLst>
+                                    </p:anim>
+                                    <p:anim calcmode="lin" valueType="num">
+                                      <p:cBhvr>
+                                        <p:cTn id="9" dur="1000" fill="hold"/>
+                                        <p:tgtEl>
+                                          <p:spTgt spid="9"/>
+                                        </p:tgtEl>
+                                        <p:attrNameLst>
+                                          <p:attrName>style.rotation</p:attrName>
+                                        </p:attrNameLst>
+                                      </p:cBhvr>
+                                      <p:tavLst>
+                                        <p:tav tm="0">
+                                          <p:val>
+                                            <p:fltVal val="90"/>
+                                          </p:val>
+                                        </p:tav>
+                                        <p:tav tm="100000">
+                                          <p:val>
+                                            <p:fltVal val="0"/>
+                                          </p:val>
+                                        </p:tav>
+                                      </p:tavLst>
+                                    </p:anim>
+                                    <p:animEffect transition="in" filter="fade">
+                                      <p:cBhvr>
+                                        <p:cTn id="10" dur="1000"/>
+                                        <p:tgtEl>
+                                          <p:spTgt spid="9"/>
+                                        </p:tgtEl>
+                                      </p:cBhvr>
+                                    </p:animEffect>
+                                  </p:childTnLst>
+                                </p:cTn>
+                              </p:par>
+                            </p:childTnLst>
+                          </p:cTn>
+                        </p:par>
+                      </p:childTnLst>
+                    </p:cTn>
+                  </p:par>
+                </p:childTnLst>
+              </p:cTn>
+              <p:prevCondLst>
+                <p:cond evt="onPrev" delay="0">
+                  <p:tgtEl>
+                    <p:sldTgt/>
+                  </p:tgtEl>
+                </p:cond>
+              </p:prevCondLst>
+              <p:nextCondLst>
+                <p:cond evt="onNext" delay="0">
+                  <p:tgtEl>
+                    <p:sldTgt/>
+                  </p:tgtEl>
+                </p:cond>
+              </p:nextCondLst>
+            </p:seq>
+          </p:childTnLst>
+        </p:cTn>
+      </p:par>
+    </p:tnLst>
+  </p:timing>
+</p:sld>
+</file>
+
+<file path=ppt/slides/slide11.xml><?xml version="1.0" encoding="utf-8"?>
+<p:sld xmlns:a="http://schemas.openxmlformats.org/drawingml/2006/main" xmlns:r="http://schemas.openxmlformats.org/officeDocument/2006/relationships" xmlns:p="http://schemas.openxmlformats.org/presentationml/2006/main">
+  <p:cSld>
+    <p:spTree>
+      <p:nvGrpSpPr>
+        <p:cNvPr id="1" name=""/>
+        <p:cNvGrpSpPr/>
+        <p:nvPr/>
+      </p:nvGrpSpPr>
+      <p:grpSpPr>
+        <a:xfrm>
+          <a:off x="0" y="0"/>
+          <a:ext cx="0" cy="0"/>
+          <a:chOff x="0" y="0"/>
+          <a:chExt cx="0" cy="0"/>
+        </a:xfrm>
+      </p:grpSpPr>
+      <p:sp>
+        <p:nvSpPr>
+          <p:cNvPr id="4" name="Title 3"/>
+          <p:cNvSpPr>
+            <a:spLocks noGrp="1"/>
+          </p:cNvSpPr>
+          <p:nvPr>
+            <p:ph type="title"/>
+          </p:nvPr>
+        </p:nvSpPr>
+        <p:spPr/>
+        <p:txBody>
+          <a:bodyPr/>
+          <a:lstStyle/>
+          <a:p>
+            <a:pPr algn="ctr"/>
+            <a:r>
+              <a:rPr lang="en-US" dirty="0" smtClean="0"/>
+              <a:t>UML Diagram </a:t>
+            </a:r>
+            <a:r>
+              <a:rPr lang="en-US" dirty="0"/>
+              <a:t>(</a:t>
+            </a:r>
+            <a:r>
+              <a:rPr lang="en-US" sz="3400" dirty="0"/>
+              <a:t>Use Case</a:t>
+            </a:r>
+            <a:r>
+              <a:rPr lang="en-US" dirty="0"/>
+              <a:t>)</a:t>
+            </a:r>
+            <a:r>
+              <a:rPr lang="en-US" dirty="0" smtClean="0"/>
+              <a:t> For Buyer</a:t>
+            </a:r>
+            <a:endParaRPr lang="en-US" dirty="0"/>
+          </a:p>
+        </p:txBody>
+      </p:sp>
+      <p:pic>
+        <p:nvPicPr>
+          <p:cNvPr id="3" name="Content Placeholder 2"/>
+          <p:cNvPicPr>
+            <a:picLocks noGrp="1" noChangeAspect="1"/>
+          </p:cNvPicPr>
+          <p:nvPr>
+            <p:ph idx="1"/>
+          </p:nvPr>
+        </p:nvPicPr>
+        <p:blipFill>
+          <a:blip r:embed="rId2">
+            <a:extLst>
+              <a:ext uri="{28A0092B-C50C-407E-A947-70E740481C1C}">
+                <a14:useLocalDpi xmlns:a14="http://schemas.microsoft.com/office/drawing/2010/main" val="0"/>
+              </a:ext>
+            </a:extLst>
+          </a:blip>
+          <a:stretch>
+            <a:fillRect/>
+          </a:stretch>
+        </p:blipFill>
+        <p:spPr>
+          <a:xfrm>
+            <a:off x="2764757" y="1573213"/>
+            <a:ext cx="6662487" cy="4141787"/>
+          </a:xfrm>
+        </p:spPr>
+      </p:pic>
+    </p:spTree>
+    <p:extLst>
+      <p:ext uri="{BB962C8B-B14F-4D97-AF65-F5344CB8AC3E}">
+        <p14:creationId xmlns:p14="http://schemas.microsoft.com/office/powerpoint/2010/main" val="1599805609"/>
+      </p:ext>
+    </p:extLst>
+  </p:cSld>
+  <p:clrMapOvr>
+    <a:masterClrMapping/>
+  </p:clrMapOvr>
+  <mc:AlternateContent xmlns:mc="http://schemas.openxmlformats.org/markup-compatibility/2006" xmlns:p14="http://schemas.microsoft.com/office/powerpoint/2010/main">
+    <mc:Choice Requires="p14">
+      <p:transition spd="med" p14:dur="700">
+        <p:fade/>
+      </p:transition>
+    </mc:Choice>
+    <mc:Fallback xmlns="">
+      <p:transition spd="med">
+        <p:fade/>
+      </p:transition>
+    </mc:Fallback>
+  </mc:AlternateContent>
+  <p:timing>
+    <p:tnLst>
+      <p:par>
+        <p:cTn id="1" dur="indefinite" restart="never" nodeType="tmRoot">
+          <p:childTnLst>
+            <p:seq concurrent="1" nextAc="seek">
+              <p:cTn id="2" dur="indefinite" nodeType="mainSeq">
+                <p:childTnLst>
+                  <p:par>
+                    <p:cTn id="3" fill="hold">
+                      <p:stCondLst>
+                        <p:cond delay="indefinite"/>
+                        <p:cond evt="onBegin" delay="0">
+                          <p:tn val="2"/>
+                        </p:cond>
+                      </p:stCondLst>
+                      <p:childTnLst>
+                        <p:par>
+                          <p:cTn id="4" fill="hold">
+                            <p:stCondLst>
+                              <p:cond delay="0"/>
+                            </p:stCondLst>
+                            <p:childTnLst>
+                              <p:par>
+                                <p:cTn id="5" presetID="31" presetClass="entr" presetSubtype="0" fill="hold" nodeType="withEffect">
+                                  <p:stCondLst>
+                                    <p:cond delay="0"/>
+                                  </p:stCondLst>
+                                  <p:childTnLst>
+                                    <p:set>
+                                      <p:cBhvr>
+                                        <p:cTn id="6" dur="1" fill="hold">
+                                          <p:stCondLst>
+                                            <p:cond delay="0"/>
+                                          </p:stCondLst>
+                                        </p:cTn>
+                                        <p:tgtEl>
+                                          <p:spTgt spid="3"/>
+                                        </p:tgtEl>
+                                        <p:attrNameLst>
+                                          <p:attrName>style.visibility</p:attrName>
+                                        </p:attrNameLst>
+                                      </p:cBhvr>
+                                      <p:to>
+                                        <p:strVal val="visible"/>
+                                      </p:to>
+                                    </p:set>
+                                    <p:anim calcmode="lin" valueType="num">
+                                      <p:cBhvr>
+                                        <p:cTn id="7" dur="1000" fill="hold"/>
+                                        <p:tgtEl>
+                                          <p:spTgt spid="3"/>
+                                        </p:tgtEl>
+                                        <p:attrNameLst>
+                                          <p:attrName>ppt_w</p:attrName>
+                                        </p:attrNameLst>
+                                      </p:cBhvr>
+                                      <p:tavLst>
+                                        <p:tav tm="0">
+                                          <p:val>
+                                            <p:fltVal val="0"/>
+                                          </p:val>
+                                        </p:tav>
+                                        <p:tav tm="100000">
+                                          <p:val>
+                                            <p:strVal val="#ppt_w"/>
+                                          </p:val>
+                                        </p:tav>
+                                      </p:tavLst>
+                                    </p:anim>
+                                    <p:anim calcmode="lin" valueType="num">
+                                      <p:cBhvr>
+                                        <p:cTn id="8" dur="1000" fill="hold"/>
+                                        <p:tgtEl>
+                                          <p:spTgt spid="3"/>
+                                        </p:tgtEl>
+                                        <p:attrNameLst>
+                                          <p:attrName>ppt_h</p:attrName>
+                                        </p:attrNameLst>
+                                      </p:cBhvr>
+                                      <p:tavLst>
+                                        <p:tav tm="0">
+                                          <p:val>
+                                            <p:fltVal val="0"/>
+                                          </p:val>
+                                        </p:tav>
+                                        <p:tav tm="100000">
+                                          <p:val>
+                                            <p:strVal val="#ppt_h"/>
+                                          </p:val>
+                                        </p:tav>
+                                      </p:tavLst>
+                                    </p:anim>
+                                    <p:anim calcmode="lin" valueType="num">
+                                      <p:cBhvr>
+                                        <p:cTn id="9" dur="1000" fill="hold"/>
+                                        <p:tgtEl>
+                                          <p:spTgt spid="3"/>
+                                        </p:tgtEl>
+                                        <p:attrNameLst>
+                                          <p:attrName>style.rotation</p:attrName>
+                                        </p:attrNameLst>
+                                      </p:cBhvr>
+                                      <p:tavLst>
+                                        <p:tav tm="0">
+                                          <p:val>
+                                            <p:fltVal val="90"/>
+                                          </p:val>
+                                        </p:tav>
+                                        <p:tav tm="100000">
+                                          <p:val>
+                                            <p:fltVal val="0"/>
+                                          </p:val>
+                                        </p:tav>
+                                      </p:tavLst>
+                                    </p:anim>
+                                    <p:animEffect transition="in" filter="fade">
+                                      <p:cBhvr>
+                                        <p:cTn id="10" dur="1000"/>
+                                        <p:tgtEl>
+                                          <p:spTgt spid="3"/>
+                                        </p:tgtEl>
+                                      </p:cBhvr>
+                                    </p:animEffect>
+                                  </p:childTnLst>
+                                </p:cTn>
+                              </p:par>
+                            </p:childTnLst>
+                          </p:cTn>
+                        </p:par>
+                      </p:childTnLst>
+                    </p:cTn>
+                  </p:par>
+                </p:childTnLst>
+              </p:cTn>
+              <p:prevCondLst>
+                <p:cond evt="onPrev" delay="0">
+                  <p:tgtEl>
+                    <p:sldTgt/>
+                  </p:tgtEl>
+                </p:cond>
+              </p:prevCondLst>
+              <p:nextCondLst>
+                <p:cond evt="onNext" delay="0">
+                  <p:tgtEl>
+                    <p:sldTgt/>
+                  </p:tgtEl>
+                </p:cond>
+              </p:nextCondLst>
+            </p:seq>
+          </p:childTnLst>
+        </p:cTn>
+      </p:par>
+    </p:tnLst>
+  </p:timing>
+</p:sld>
+</file>
+
+<file path=ppt/slides/slide12.xml><?xml version="1.0" encoding="utf-8"?>
+<p:sld xmlns:a="http://schemas.openxmlformats.org/drawingml/2006/main" xmlns:r="http://schemas.openxmlformats.org/officeDocument/2006/relationships" xmlns:p="http://schemas.openxmlformats.org/presentationml/2006/main">
+  <p:cSld>
+    <p:spTree>
+      <p:nvGrpSpPr>
+        <p:cNvPr id="1" name=""/>
+        <p:cNvGrpSpPr/>
+        <p:nvPr/>
+      </p:nvGrpSpPr>
+      <p:grpSpPr>
+        <a:xfrm>
+          <a:off x="0" y="0"/>
+          <a:ext cx="0" cy="0"/>
+          <a:chOff x="0" y="0"/>
+          <a:chExt cx="0" cy="0"/>
+        </a:xfrm>
+      </p:grpSpPr>
+      <p:sp>
+        <p:nvSpPr>
+          <p:cNvPr id="4" name="Title 3"/>
+          <p:cNvSpPr>
+            <a:spLocks noGrp="1"/>
+          </p:cNvSpPr>
+          <p:nvPr>
+            <p:ph type="title"/>
+          </p:nvPr>
+        </p:nvSpPr>
+        <p:spPr/>
+        <p:txBody>
+          <a:bodyPr/>
+          <a:lstStyle/>
+          <a:p>
+            <a:pPr algn="ctr"/>
+            <a:r>
+              <a:rPr lang="en-US" dirty="0" smtClean="0"/>
+              <a:t>UML Diagram </a:t>
+            </a:r>
+            <a:r>
+              <a:rPr lang="en-US" dirty="0"/>
+              <a:t>(</a:t>
+            </a:r>
+            <a:r>
+              <a:rPr lang="en-US" sz="3400" dirty="0"/>
+              <a:t>Use Case</a:t>
+            </a:r>
+            <a:r>
+              <a:rPr lang="en-US" dirty="0"/>
+              <a:t>)</a:t>
+            </a:r>
+            <a:r>
+              <a:rPr lang="en-US" dirty="0" smtClean="0"/>
+              <a:t> For Seller</a:t>
+            </a:r>
+            <a:endParaRPr lang="en-US" dirty="0"/>
+          </a:p>
+        </p:txBody>
+      </p:sp>
+      <p:pic>
+        <p:nvPicPr>
+          <p:cNvPr id="3" name="Content Placeholder 2"/>
+          <p:cNvPicPr>
+            <a:picLocks noGrp="1" noChangeAspect="1"/>
+          </p:cNvPicPr>
+          <p:nvPr>
+            <p:ph idx="1"/>
+          </p:nvPr>
+        </p:nvPicPr>
+        <p:blipFill>
+          <a:blip r:embed="rId2">
+            <a:extLst>
+              <a:ext uri="{28A0092B-C50C-407E-A947-70E740481C1C}">
+                <a14:useLocalDpi xmlns:a14="http://schemas.microsoft.com/office/drawing/2010/main" val="0"/>
+              </a:ext>
+            </a:extLst>
+          </a:blip>
+          <a:stretch>
+            <a:fillRect/>
+          </a:stretch>
+        </p:blipFill>
+        <p:spPr>
+          <a:xfrm>
+            <a:off x="2746942" y="1573213"/>
+            <a:ext cx="6698116" cy="4141787"/>
+          </a:xfrm>
+        </p:spPr>
+      </p:pic>
+    </p:spTree>
+    <p:extLst>
+      <p:ext uri="{BB962C8B-B14F-4D97-AF65-F5344CB8AC3E}">
+        <p14:creationId xmlns:p14="http://schemas.microsoft.com/office/powerpoint/2010/main" val="2238765373"/>
+      </p:ext>
+    </p:extLst>
+  </p:cSld>
+  <p:clrMapOvr>
+    <a:masterClrMapping/>
+  </p:clrMapOvr>
+  <mc:AlternateContent xmlns:mc="http://schemas.openxmlformats.org/markup-compatibility/2006" xmlns:p14="http://schemas.microsoft.com/office/powerpoint/2010/main">
+    <mc:Choice Requires="p14">
+      <p:transition spd="med" p14:dur="700">
+        <p:fade/>
+      </p:transition>
+    </mc:Choice>
+    <mc:Fallback xmlns="">
+      <p:transition spd="med">
+        <p:fade/>
+      </p:transition>
+    </mc:Fallback>
+  </mc:AlternateContent>
+  <p:timing>
+    <p:tnLst>
+      <p:par>
+        <p:cTn id="1" dur="indefinite" restart="never" nodeType="tmRoot">
+          <p:childTnLst>
+            <p:seq concurrent="1" nextAc="seek">
+              <p:cTn id="2" dur="indefinite" nodeType="mainSeq">
+                <p:childTnLst>
+                  <p:par>
+                    <p:cTn id="3" fill="hold">
+                      <p:stCondLst>
+                        <p:cond delay="indefinite"/>
+                        <p:cond evt="onBegin" delay="0">
+                          <p:tn val="2"/>
+                        </p:cond>
+                      </p:stCondLst>
+                      <p:childTnLst>
+                        <p:par>
+                          <p:cTn id="4" fill="hold">
+                            <p:stCondLst>
+                              <p:cond delay="0"/>
+                            </p:stCondLst>
+                            <p:childTnLst>
+                              <p:par>
+                                <p:cTn id="5" presetID="31" presetClass="entr" presetSubtype="0" fill="hold" nodeType="withEffect">
+                                  <p:stCondLst>
+                                    <p:cond delay="0"/>
+                                  </p:stCondLst>
+                                  <p:childTnLst>
+                                    <p:set>
+                                      <p:cBhvr>
+                                        <p:cTn id="6" dur="1" fill="hold">
+                                          <p:stCondLst>
+                                            <p:cond delay="0"/>
+                                          </p:stCondLst>
+                                        </p:cTn>
+                                        <p:tgtEl>
+                                          <p:spTgt spid="3"/>
+                                        </p:tgtEl>
+                                        <p:attrNameLst>
+                                          <p:attrName>style.visibility</p:attrName>
+                                        </p:attrNameLst>
+                                      </p:cBhvr>
+                                      <p:to>
+                                        <p:strVal val="visible"/>
+                                      </p:to>
+                                    </p:set>
+                                    <p:anim calcmode="lin" valueType="num">
+                                      <p:cBhvr>
+                                        <p:cTn id="7" dur="1000" fill="hold"/>
+                                        <p:tgtEl>
+                                          <p:spTgt spid="3"/>
+                                        </p:tgtEl>
+                                        <p:attrNameLst>
+                                          <p:attrName>ppt_w</p:attrName>
+                                        </p:attrNameLst>
+                                      </p:cBhvr>
+                                      <p:tavLst>
+                                        <p:tav tm="0">
+                                          <p:val>
+                                            <p:fltVal val="0"/>
+                                          </p:val>
+                                        </p:tav>
+                                        <p:tav tm="100000">
+                                          <p:val>
+                                            <p:strVal val="#ppt_w"/>
+                                          </p:val>
+                                        </p:tav>
+                                      </p:tavLst>
+                                    </p:anim>
+                                    <p:anim calcmode="lin" valueType="num">
+                                      <p:cBhvr>
+                                        <p:cTn id="8" dur="1000" fill="hold"/>
+                                        <p:tgtEl>
+                                          <p:spTgt spid="3"/>
+                                        </p:tgtEl>
+                                        <p:attrNameLst>
+                                          <p:attrName>ppt_h</p:attrName>
+                                        </p:attrNameLst>
+                                      </p:cBhvr>
+                                      <p:tavLst>
+                                        <p:tav tm="0">
+                                          <p:val>
+                                            <p:fltVal val="0"/>
+                                          </p:val>
+                                        </p:tav>
+                                        <p:tav tm="100000">
+                                          <p:val>
+                                            <p:strVal val="#ppt_h"/>
+                                          </p:val>
+                                        </p:tav>
+                                      </p:tavLst>
+                                    </p:anim>
+                                    <p:anim calcmode="lin" valueType="num">
+                                      <p:cBhvr>
+                                        <p:cTn id="9" dur="1000" fill="hold"/>
+                                        <p:tgtEl>
+                                          <p:spTgt spid="3"/>
+                                        </p:tgtEl>
+                                        <p:attrNameLst>
+                                          <p:attrName>style.rotation</p:attrName>
+                                        </p:attrNameLst>
+                                      </p:cBhvr>
+                                      <p:tavLst>
+                                        <p:tav tm="0">
+                                          <p:val>
+                                            <p:fltVal val="90"/>
+                                          </p:val>
+                                        </p:tav>
+                                        <p:tav tm="100000">
+                                          <p:val>
+                                            <p:fltVal val="0"/>
+                                          </p:val>
+                                        </p:tav>
+                                      </p:tavLst>
+                                    </p:anim>
+                                    <p:animEffect transition="in" filter="fade">
+                                      <p:cBhvr>
+                                        <p:cTn id="10" dur="1000"/>
+                                        <p:tgtEl>
+                                          <p:spTgt spid="3"/>
+                                        </p:tgtEl>
+                                      </p:cBhvr>
+                                    </p:animEffect>
+                                  </p:childTnLst>
+                                </p:cTn>
+                              </p:par>
+                            </p:childTnLst>
+                          </p:cTn>
+                        </p:par>
+                      </p:childTnLst>
+                    </p:cTn>
+                  </p:par>
+                </p:childTnLst>
+              </p:cTn>
+              <p:prevCondLst>
+                <p:cond evt="onPrev" delay="0">
+                  <p:tgtEl>
+                    <p:sldTgt/>
+                  </p:tgtEl>
+                </p:cond>
+              </p:prevCondLst>
+              <p:nextCondLst>
+                <p:cond evt="onNext" delay="0">
+                  <p:tgtEl>
+                    <p:sldTgt/>
+                  </p:tgtEl>
+                </p:cond>
+              </p:nextCondLst>
+            </p:seq>
+          </p:childTnLst>
+        </p:cTn>
+      </p:par>
+    </p:tnLst>
+  </p:timing>
+</p:sld>
+</file>
+
+<file path=ppt/slides/slide13.xml><?xml version="1.0" encoding="utf-8"?>
+<p:sld xmlns:a="http://schemas.openxmlformats.org/drawingml/2006/main" xmlns:r="http://schemas.openxmlformats.org/officeDocument/2006/relationships" xmlns:p="http://schemas.openxmlformats.org/presentationml/2006/main">
+  <p:cSld>
+    <p:spTree>
+      <p:nvGrpSpPr>
+        <p:cNvPr id="1" name=""/>
+        <p:cNvGrpSpPr/>
+        <p:nvPr/>
+      </p:nvGrpSpPr>
+      <p:grpSpPr>
+        <a:xfrm>
+          <a:off x="0" y="0"/>
+          <a:ext cx="0" cy="0"/>
+          <a:chOff x="0" y="0"/>
+          <a:chExt cx="0" cy="0"/>
+        </a:xfrm>
+      </p:grpSpPr>
+      <p:sp>
+        <p:nvSpPr>
           <p:cNvPr id="7" name="Title 6"/>
           <p:cNvSpPr>
             <a:spLocks noGrp="1"/>
@@ -7585,6 +8386,9 @@
                     <p:cTn id="3" fill="hold">
                       <p:stCondLst>
                         <p:cond delay="indefinite"/>
+                        <p:cond evt="onBegin" delay="0">
+                          <p:tn val="2"/>
+                        </p:cond>
                       </p:stCondLst>
                       <p:childTnLst>
                         <p:par>
@@ -7594,7 +8398,7 @@
                             </p:stCondLst>
                             <p:childTnLst>
                               <p:par>
-                                <p:cTn id="5" presetID="42" presetClass="entr" presetSubtype="0" fill="hold" nodeType="clickEffect">
+                                <p:cTn id="5" presetID="42" presetClass="entr" presetSubtype="0" fill="hold" nodeType="withEffect">
                                   <p:stCondLst>
                                     <p:cond delay="0"/>
                                   </p:stCondLst>
@@ -7789,7 +8593,7 @@
 </p:sld>
 </file>
 
-<file path=ppt/slides/slide11.xml><?xml version="1.0" encoding="utf-8"?>
+<file path=ppt/slides/slide14.xml><?xml version="1.0" encoding="utf-8"?>
 <p:sld xmlns:a="http://schemas.openxmlformats.org/drawingml/2006/main" xmlns:r="http://schemas.openxmlformats.org/officeDocument/2006/relationships" xmlns:p="http://schemas.openxmlformats.org/presentationml/2006/main">
   <p:cSld>
     <p:spTree>
@@ -8126,33 +8930,15 @@
                                   </p:childTnLst>
                                 </p:cTn>
                               </p:par>
-                            </p:childTnLst>
-                          </p:cTn>
-                        </p:par>
-                      </p:childTnLst>
-                    </p:cTn>
-                  </p:par>
-                  <p:par>
-                    <p:cTn id="17" fill="hold">
-                      <p:stCondLst>
-                        <p:cond delay="indefinite"/>
-                      </p:stCondLst>
-                      <p:childTnLst>
-                        <p:par>
-                          <p:cTn id="18" fill="hold">
-                            <p:stCondLst>
-                              <p:cond delay="0"/>
-                            </p:stCondLst>
-                            <p:childTnLst>
                               <p:par>
-                                <p:cTn id="19" presetID="31" presetClass="entr" presetSubtype="0" fill="hold" nodeType="clickEffect">
+                                <p:cTn id="17" presetID="31" presetClass="entr" presetSubtype="0" fill="hold" nodeType="withEffect">
                                   <p:stCondLst>
                                     <p:cond delay="0"/>
                                   </p:stCondLst>
                                   <p:childTnLst>
                                     <p:set>
                                       <p:cBhvr>
-                                        <p:cTn id="20" dur="1" fill="hold">
+                                        <p:cTn id="18" dur="1" fill="hold">
                                           <p:stCondLst>
                                             <p:cond delay="0"/>
                                           </p:stCondLst>
@@ -8170,7 +8956,7 @@
                                     </p:set>
                                     <p:anim calcmode="lin" valueType="num">
                                       <p:cBhvr>
-                                        <p:cTn id="21" dur="1000" fill="hold"/>
+                                        <p:cTn id="19" dur="1000" fill="hold"/>
                                         <p:tgtEl>
                                           <p:spTgt spid="4"/>
                                         </p:tgtEl>
@@ -8193,7 +8979,7 @@
                                     </p:anim>
                                     <p:anim calcmode="lin" valueType="num">
                                       <p:cBhvr>
-                                        <p:cTn id="22" dur="1000" fill="hold"/>
+                                        <p:cTn id="20" dur="1000" fill="hold"/>
                                         <p:tgtEl>
                                           <p:spTgt spid="4"/>
                                         </p:tgtEl>
@@ -8216,7 +9002,7 @@
                                     </p:anim>
                                     <p:anim calcmode="lin" valueType="num">
                                       <p:cBhvr>
-                                        <p:cTn id="23" dur="1000" fill="hold"/>
+                                        <p:cTn id="21" dur="1000" fill="hold"/>
                                         <p:tgtEl>
                                           <p:spTgt spid="4"/>
                                         </p:tgtEl>
@@ -8239,7 +9025,7 @@
                                     </p:anim>
                                     <p:animEffect transition="in" filter="fade">
                                       <p:cBhvr>
-                                        <p:cTn id="24" dur="1000"/>
+                                        <p:cTn id="22" dur="1000"/>
                                         <p:tgtEl>
                                           <p:spTgt spid="4"/>
                                         </p:tgtEl>
@@ -8283,7 +9069,7 @@
 </p:sld>
 </file>
 
-<file path=ppt/slides/slide12.xml><?xml version="1.0" encoding="utf-8"?>
+<file path=ppt/slides/slide15.xml><?xml version="1.0" encoding="utf-8"?>
 <p:sld xmlns:a="http://schemas.openxmlformats.org/drawingml/2006/main" xmlns:r="http://schemas.openxmlformats.org/officeDocument/2006/relationships" xmlns:p="http://schemas.openxmlformats.org/presentationml/2006/main">
   <p:cSld>
     <p:spTree>
@@ -8396,11 +9182,7 @@
             </a:r>
             <a:r>
               <a:rPr lang="en-US" sz="2000" dirty="0" smtClean="0"/>
-              <a:t> has ver</a:t>
-            </a:r>
-            <a:r>
-              <a:rPr lang="en-US" sz="2000" dirty="0" smtClean="0"/>
-              <a:t>y good community support. </a:t>
+              <a:t> has very good community support. </a:t>
             </a:r>
           </a:p>
           <a:p>
@@ -8982,7 +9764,7 @@
 </p:sld>
 </file>
 
-<file path=ppt/slides/slide13.xml><?xml version="1.0" encoding="utf-8"?>
+<file path=ppt/slides/slide16.xml><?xml version="1.0" encoding="utf-8"?>
 <p:sld xmlns:a="http://schemas.openxmlformats.org/drawingml/2006/main" xmlns:r="http://schemas.openxmlformats.org/officeDocument/2006/relationships" xmlns:p="http://schemas.openxmlformats.org/presentationml/2006/main">
   <p:cSld>
     <p:spTree>
@@ -9674,11 +10456,7 @@
             </a:r>
             <a:r>
               <a:rPr lang="en-US" dirty="0" smtClean="0"/>
-              <a:t> will be the first auction website in Bangladesh</a:t>
-            </a:r>
-            <a:r>
-              <a:rPr lang="en-US" dirty="0" smtClean="0"/>
-              <a:t>.</a:t>
+              <a:t> will be the first auction website in Bangladesh.</a:t>
             </a:r>
           </a:p>
           <a:p>
@@ -10689,11 +11467,7 @@
             </a:r>
             <a:r>
               <a:rPr lang="en-US" dirty="0" smtClean="0"/>
-              <a:t> have not implemented live auction broadcasting yet</a:t>
-            </a:r>
-            <a:r>
-              <a:rPr lang="en-US" dirty="0" smtClean="0"/>
-              <a:t>.</a:t>
+              <a:t> have not implemented live auction broadcasting yet.</a:t>
             </a:r>
           </a:p>
           <a:p>
@@ -11706,7 +12480,7 @@
         <p:spPr/>
         <p:txBody>
           <a:bodyPr>
-            <a:normAutofit/>
+            <a:normAutofit lnSpcReduction="10000"/>
           </a:bodyPr>
           <a:lstStyle/>
           <a:p>
@@ -11769,9 +12543,24 @@
             </a:r>
             <a:r>
               <a:rPr lang="en-US" dirty="0"/>
-              <a:t> will charge 5% for each sale. So it is profitable.</a:t>
-            </a:r>
-            <a:endParaRPr lang="en-US" sz="1200" dirty="0"/>
+              <a:t> will charge 5% for each sale. So it is profitable</a:t>
+            </a:r>
+            <a:r>
+              <a:rPr lang="en-US" dirty="0" smtClean="0"/>
+              <a:t>.</a:t>
+            </a:r>
+          </a:p>
+          <a:p>
+            <a:pPr lvl="1"/>
+            <a:r>
+              <a:rPr lang="en-US" dirty="0"/>
+              <a:t>User can attend or bid on products from anywhere. User don’t have to be there physically</a:t>
+            </a:r>
+            <a:r>
+              <a:rPr lang="en-US" dirty="0" smtClean="0"/>
+              <a:t>.</a:t>
+            </a:r>
+            <a:endParaRPr lang="en-US" dirty="0"/>
           </a:p>
           <a:p>
             <a:pPr lvl="0"/>
@@ -12456,6 +13245,103 @@
                                   </p:childTnLst>
                                 </p:cTn>
                               </p:par>
+                              <p:par>
+                                <p:cTn id="37" presetID="42" presetClass="entr" presetSubtype="0" fill="hold" grpId="0" nodeType="withEffect">
+                                  <p:stCondLst>
+                                    <p:cond delay="0"/>
+                                  </p:stCondLst>
+                                  <p:childTnLst>
+                                    <p:set>
+                                      <p:cBhvr>
+                                        <p:cTn id="38" dur="1" fill="hold">
+                                          <p:stCondLst>
+                                            <p:cond delay="0"/>
+                                          </p:stCondLst>
+                                        </p:cTn>
+                                        <p:tgtEl>
+                                          <p:spTgt spid="8">
+                                            <p:txEl>
+                                              <p:pRg st="6" end="6"/>
+                                            </p:txEl>
+                                          </p:spTgt>
+                                        </p:tgtEl>
+                                        <p:attrNameLst>
+                                          <p:attrName>style.visibility</p:attrName>
+                                        </p:attrNameLst>
+                                      </p:cBhvr>
+                                      <p:to>
+                                        <p:strVal val="visible"/>
+                                      </p:to>
+                                    </p:set>
+                                    <p:animEffect transition="in" filter="fade">
+                                      <p:cBhvr>
+                                        <p:cTn id="39" dur="1000"/>
+                                        <p:tgtEl>
+                                          <p:spTgt spid="8">
+                                            <p:txEl>
+                                              <p:pRg st="6" end="6"/>
+                                            </p:txEl>
+                                          </p:spTgt>
+                                        </p:tgtEl>
+                                      </p:cBhvr>
+                                    </p:animEffect>
+                                    <p:anim calcmode="lin" valueType="num">
+                                      <p:cBhvr>
+                                        <p:cTn id="40" dur="1000" fill="hold"/>
+                                        <p:tgtEl>
+                                          <p:spTgt spid="8">
+                                            <p:txEl>
+                                              <p:pRg st="6" end="6"/>
+                                            </p:txEl>
+                                          </p:spTgt>
+                                        </p:tgtEl>
+                                        <p:attrNameLst>
+                                          <p:attrName>ppt_x</p:attrName>
+                                        </p:attrNameLst>
+                                      </p:cBhvr>
+                                      <p:tavLst>
+                                        <p:tav tm="0">
+                                          <p:val>
+                                            <p:strVal val="#ppt_x"/>
+                                          </p:val>
+                                        </p:tav>
+                                        <p:tav tm="100000">
+                                          <p:val>
+                                            <p:strVal val="#ppt_x"/>
+                                          </p:val>
+                                        </p:tav>
+                                      </p:tavLst>
+                                    </p:anim>
+                                    <p:anim calcmode="lin" valueType="num">
+                                      <p:cBhvr>
+                                        <p:cTn id="41" dur="1000" fill="hold"/>
+                                        <p:tgtEl>
+                                          <p:spTgt spid="8">
+                                            <p:txEl>
+                                              <p:pRg st="6" end="6"/>
+                                            </p:txEl>
+                                          </p:spTgt>
+                                        </p:tgtEl>
+                                        <p:attrNameLst>
+                                          <p:attrName>ppt_y</p:attrName>
+                                        </p:attrNameLst>
+                                      </p:cBhvr>
+                                      <p:tavLst>
+                                        <p:tav tm="0">
+                                          <p:val>
+                                            <p:strVal val="#ppt_y+.1"/>
+                                          </p:val>
+                                        </p:tav>
+                                        <p:tav tm="100000">
+                                          <p:val>
+                                            <p:strVal val="#ppt_y"/>
+                                          </p:val>
+                                        </p:tav>
+                                      </p:tavLst>
+                                    </p:anim>
+                                  </p:childTnLst>
+                                </p:cTn>
+                              </p:par>
                             </p:childTnLst>
                           </p:cTn>
                         </p:par>
@@ -12463,116 +13349,19 @@
                     </p:cTn>
                   </p:par>
                   <p:par>
-                    <p:cTn id="37" fill="hold">
+                    <p:cTn id="42" fill="hold">
                       <p:stCondLst>
                         <p:cond delay="indefinite"/>
                       </p:stCondLst>
                       <p:childTnLst>
                         <p:par>
-                          <p:cTn id="38" fill="hold">
+                          <p:cTn id="43" fill="hold">
                             <p:stCondLst>
                               <p:cond delay="0"/>
                             </p:stCondLst>
                             <p:childTnLst>
                               <p:par>
-                                <p:cTn id="39" presetID="42" presetClass="entr" presetSubtype="0" fill="hold" grpId="0" nodeType="clickEffect">
-                                  <p:stCondLst>
-                                    <p:cond delay="0"/>
-                                  </p:stCondLst>
-                                  <p:childTnLst>
-                                    <p:set>
-                                      <p:cBhvr>
-                                        <p:cTn id="40" dur="1" fill="hold">
-                                          <p:stCondLst>
-                                            <p:cond delay="0"/>
-                                          </p:stCondLst>
-                                        </p:cTn>
-                                        <p:tgtEl>
-                                          <p:spTgt spid="8">
-                                            <p:txEl>
-                                              <p:pRg st="6" end="6"/>
-                                            </p:txEl>
-                                          </p:spTgt>
-                                        </p:tgtEl>
-                                        <p:attrNameLst>
-                                          <p:attrName>style.visibility</p:attrName>
-                                        </p:attrNameLst>
-                                      </p:cBhvr>
-                                      <p:to>
-                                        <p:strVal val="visible"/>
-                                      </p:to>
-                                    </p:set>
-                                    <p:animEffect transition="in" filter="fade">
-                                      <p:cBhvr>
-                                        <p:cTn id="41" dur="1000"/>
-                                        <p:tgtEl>
-                                          <p:spTgt spid="8">
-                                            <p:txEl>
-                                              <p:pRg st="6" end="6"/>
-                                            </p:txEl>
-                                          </p:spTgt>
-                                        </p:tgtEl>
-                                      </p:cBhvr>
-                                    </p:animEffect>
-                                    <p:anim calcmode="lin" valueType="num">
-                                      <p:cBhvr>
-                                        <p:cTn id="42" dur="1000" fill="hold"/>
-                                        <p:tgtEl>
-                                          <p:spTgt spid="8">
-                                            <p:txEl>
-                                              <p:pRg st="6" end="6"/>
-                                            </p:txEl>
-                                          </p:spTgt>
-                                        </p:tgtEl>
-                                        <p:attrNameLst>
-                                          <p:attrName>ppt_x</p:attrName>
-                                        </p:attrNameLst>
-                                      </p:cBhvr>
-                                      <p:tavLst>
-                                        <p:tav tm="0">
-                                          <p:val>
-                                            <p:strVal val="#ppt_x"/>
-                                          </p:val>
-                                        </p:tav>
-                                        <p:tav tm="100000">
-                                          <p:val>
-                                            <p:strVal val="#ppt_x"/>
-                                          </p:val>
-                                        </p:tav>
-                                      </p:tavLst>
-                                    </p:anim>
-                                    <p:anim calcmode="lin" valueType="num">
-                                      <p:cBhvr>
-                                        <p:cTn id="43" dur="1000" fill="hold"/>
-                                        <p:tgtEl>
-                                          <p:spTgt spid="8">
-                                            <p:txEl>
-                                              <p:pRg st="6" end="6"/>
-                                            </p:txEl>
-                                          </p:spTgt>
-                                        </p:tgtEl>
-                                        <p:attrNameLst>
-                                          <p:attrName>ppt_y</p:attrName>
-                                        </p:attrNameLst>
-                                      </p:cBhvr>
-                                      <p:tavLst>
-                                        <p:tav tm="0">
-                                          <p:val>
-                                            <p:strVal val="#ppt_y+.1"/>
-                                          </p:val>
-                                        </p:tav>
-                                        <p:tav tm="100000">
-                                          <p:val>
-                                            <p:strVal val="#ppt_y"/>
-                                          </p:val>
-                                        </p:tav>
-                                      </p:tavLst>
-                                    </p:anim>
-                                  </p:childTnLst>
-                                </p:cTn>
-                              </p:par>
-                              <p:par>
-                                <p:cTn id="44" presetID="42" presetClass="entr" presetSubtype="0" fill="hold" grpId="0" nodeType="withEffect">
+                                <p:cTn id="44" presetID="42" presetClass="entr" presetSubtype="0" fill="hold" grpId="0" nodeType="clickEffect">
                                   <p:stCondLst>
                                     <p:cond delay="0"/>
                                   </p:stCondLst>
@@ -12742,6 +13531,103 @@
                                           <p:spTgt spid="8">
                                             <p:txEl>
                                               <p:pRg st="8" end="8"/>
+                                            </p:txEl>
+                                          </p:spTgt>
+                                        </p:tgtEl>
+                                        <p:attrNameLst>
+                                          <p:attrName>ppt_y</p:attrName>
+                                        </p:attrNameLst>
+                                      </p:cBhvr>
+                                      <p:tavLst>
+                                        <p:tav tm="0">
+                                          <p:val>
+                                            <p:strVal val="#ppt_y+.1"/>
+                                          </p:val>
+                                        </p:tav>
+                                        <p:tav tm="100000">
+                                          <p:val>
+                                            <p:strVal val="#ppt_y"/>
+                                          </p:val>
+                                        </p:tav>
+                                      </p:tavLst>
+                                    </p:anim>
+                                  </p:childTnLst>
+                                </p:cTn>
+                              </p:par>
+                              <p:par>
+                                <p:cTn id="54" presetID="42" presetClass="entr" presetSubtype="0" fill="hold" grpId="0" nodeType="withEffect">
+                                  <p:stCondLst>
+                                    <p:cond delay="0"/>
+                                  </p:stCondLst>
+                                  <p:childTnLst>
+                                    <p:set>
+                                      <p:cBhvr>
+                                        <p:cTn id="55" dur="1" fill="hold">
+                                          <p:stCondLst>
+                                            <p:cond delay="0"/>
+                                          </p:stCondLst>
+                                        </p:cTn>
+                                        <p:tgtEl>
+                                          <p:spTgt spid="8">
+                                            <p:txEl>
+                                              <p:pRg st="9" end="9"/>
+                                            </p:txEl>
+                                          </p:spTgt>
+                                        </p:tgtEl>
+                                        <p:attrNameLst>
+                                          <p:attrName>style.visibility</p:attrName>
+                                        </p:attrNameLst>
+                                      </p:cBhvr>
+                                      <p:to>
+                                        <p:strVal val="visible"/>
+                                      </p:to>
+                                    </p:set>
+                                    <p:animEffect transition="in" filter="fade">
+                                      <p:cBhvr>
+                                        <p:cTn id="56" dur="1000"/>
+                                        <p:tgtEl>
+                                          <p:spTgt spid="8">
+                                            <p:txEl>
+                                              <p:pRg st="9" end="9"/>
+                                            </p:txEl>
+                                          </p:spTgt>
+                                        </p:tgtEl>
+                                      </p:cBhvr>
+                                    </p:animEffect>
+                                    <p:anim calcmode="lin" valueType="num">
+                                      <p:cBhvr>
+                                        <p:cTn id="57" dur="1000" fill="hold"/>
+                                        <p:tgtEl>
+                                          <p:spTgt spid="8">
+                                            <p:txEl>
+                                              <p:pRg st="9" end="9"/>
+                                            </p:txEl>
+                                          </p:spTgt>
+                                        </p:tgtEl>
+                                        <p:attrNameLst>
+                                          <p:attrName>ppt_x</p:attrName>
+                                        </p:attrNameLst>
+                                      </p:cBhvr>
+                                      <p:tavLst>
+                                        <p:tav tm="0">
+                                          <p:val>
+                                            <p:strVal val="#ppt_x"/>
+                                          </p:val>
+                                        </p:tav>
+                                        <p:tav tm="100000">
+                                          <p:val>
+                                            <p:strVal val="#ppt_x"/>
+                                          </p:val>
+                                        </p:tav>
+                                      </p:tavLst>
+                                    </p:anim>
+                                    <p:anim calcmode="lin" valueType="num">
+                                      <p:cBhvr>
+                                        <p:cTn id="58" dur="1000" fill="hold"/>
+                                        <p:tgtEl>
+                                          <p:spTgt spid="8">
+                                            <p:txEl>
+                                              <p:pRg st="9" end="9"/>
                                             </p:txEl>
                                           </p:spTgt>
                                         </p:tgtEl>
@@ -14630,6 +15516,9 @@
                     <p:cTn id="3" fill="hold">
                       <p:stCondLst>
                         <p:cond delay="indefinite"/>
+                        <p:cond evt="onBegin" delay="0">
+                          <p:tn val="2"/>
+                        </p:cond>
                       </p:stCondLst>
                       <p:childTnLst>
                         <p:par>
@@ -14639,7 +15528,7 @@
                             </p:stCondLst>
                             <p:childTnLst>
                               <p:par>
-                                <p:cTn id="5" presetID="42" presetClass="entr" presetSubtype="0" fill="hold" nodeType="clickEffect">
+                                <p:cTn id="5" presetID="42" presetClass="entr" presetSubtype="0" fill="hold" nodeType="withEffect">
                                   <p:stCondLst>
                                     <p:cond delay="0"/>
                                   </p:stCondLst>

</xml_diff>

<commit_message>
updated presentaion for project
</commit_message>
<xml_diff>
--- a/NilamHut.pptx
+++ b/NilamHut.pptx
@@ -7554,13 +7554,13 @@
   <p:clrMapOvr>
     <a:masterClrMapping/>
   </p:clrMapOvr>
-  <mc:AlternateContent xmlns:mc="http://schemas.openxmlformats.org/markup-compatibility/2006">
-    <mc:Choice xmlns:p14="http://schemas.microsoft.com/office/powerpoint/2010/main" Requires="p14">
+  <mc:AlternateContent xmlns:mc="http://schemas.openxmlformats.org/markup-compatibility/2006" xmlns:p14="http://schemas.microsoft.com/office/powerpoint/2010/main">
+    <mc:Choice Requires="p14">
       <p:transition spd="med" p14:dur="700">
         <p:fade/>
       </p:transition>
     </mc:Choice>
-    <mc:Fallback>
+    <mc:Fallback xmlns="">
       <p:transition spd="med">
         <p:fade/>
       </p:transition>
@@ -8324,7 +8324,7 @@
       </p:sp>
       <p:pic>
         <p:nvPicPr>
-          <p:cNvPr id="14" name="Picture 13"/>
+          <p:cNvPr id="2" name="Picture 1"/>
           <p:cNvPicPr>
             <a:picLocks noChangeAspect="1"/>
           </p:cNvPicPr>
@@ -8344,8 +8344,8 @@
         </p:blipFill>
         <p:spPr>
           <a:xfrm>
-            <a:off x="823045" y="0"/>
-            <a:ext cx="6298971" cy="6858000"/>
+            <a:off x="411658" y="0"/>
+            <a:ext cx="5890288" cy="6858000"/>
           </a:xfrm>
           <a:prstGeom prst="rect">
             <a:avLst/>
@@ -8398,7 +8398,7 @@
                             </p:stCondLst>
                             <p:childTnLst>
                               <p:par>
-                                <p:cTn id="5" presetID="42" presetClass="entr" presetSubtype="0" fill="hold" nodeType="withEffect">
+                                <p:cTn id="5" presetID="42" presetClass="entr" presetSubtype="0" fill="hold" grpId="0" nodeType="withEffect">
                                   <p:stCondLst>
                                     <p:cond delay="0"/>
                                   </p:stCondLst>
@@ -8411,7 +8411,7 @@
                                           </p:stCondLst>
                                         </p:cTn>
                                         <p:tgtEl>
-                                          <p:spTgt spid="14"/>
+                                          <p:spTgt spid="7"/>
                                         </p:tgtEl>
                                         <p:attrNameLst>
                                           <p:attrName>style.visibility</p:attrName>
@@ -8425,7 +8425,7 @@
                                       <p:cBhvr>
                                         <p:cTn id="7" dur="1000"/>
                                         <p:tgtEl>
-                                          <p:spTgt spid="14"/>
+                                          <p:spTgt spid="7"/>
                                         </p:tgtEl>
                                       </p:cBhvr>
                                     </p:animEffect>
@@ -8433,7 +8433,7 @@
                                       <p:cBhvr>
                                         <p:cTn id="8" dur="1000" fill="hold"/>
                                         <p:tgtEl>
-                                          <p:spTgt spid="14"/>
+                                          <p:spTgt spid="7"/>
                                         </p:tgtEl>
                                         <p:attrNameLst>
                                           <p:attrName>ppt_x</p:attrName>
@@ -8456,7 +8456,7 @@
                                       <p:cBhvr>
                                         <p:cTn id="9" dur="1000" fill="hold"/>
                                         <p:tgtEl>
-                                          <p:spTgt spid="14"/>
+                                          <p:spTgt spid="7"/>
                                         </p:tgtEl>
                                         <p:attrNameLst>
                                           <p:attrName>ppt_y</p:attrName>
@@ -8479,7 +8479,7 @@
                                 </p:cTn>
                               </p:par>
                               <p:par>
-                                <p:cTn id="10" presetID="42" presetClass="entr" presetSubtype="0" fill="hold" grpId="0" nodeType="withEffect">
+                                <p:cTn id="10" presetID="42" presetClass="entr" presetSubtype="0" fill="hold" nodeType="withEffect">
                                   <p:stCondLst>
                                     <p:cond delay="0"/>
                                   </p:stCondLst>
@@ -8492,7 +8492,7 @@
                                           </p:stCondLst>
                                         </p:cTn>
                                         <p:tgtEl>
-                                          <p:spTgt spid="7"/>
+                                          <p:spTgt spid="2"/>
                                         </p:tgtEl>
                                         <p:attrNameLst>
                                           <p:attrName>style.visibility</p:attrName>
@@ -8506,7 +8506,7 @@
                                       <p:cBhvr>
                                         <p:cTn id="12" dur="1000"/>
                                         <p:tgtEl>
-                                          <p:spTgt spid="7"/>
+                                          <p:spTgt spid="2"/>
                                         </p:tgtEl>
                                       </p:cBhvr>
                                     </p:animEffect>
@@ -8514,7 +8514,7 @@
                                       <p:cBhvr>
                                         <p:cTn id="13" dur="1000" fill="hold"/>
                                         <p:tgtEl>
-                                          <p:spTgt spid="7"/>
+                                          <p:spTgt spid="2"/>
                                         </p:tgtEl>
                                         <p:attrNameLst>
                                           <p:attrName>ppt_x</p:attrName>
@@ -8537,7 +8537,7 @@
                                       <p:cBhvr>
                                         <p:cTn id="14" dur="1000" fill="hold"/>
                                         <p:tgtEl>
-                                          <p:spTgt spid="7"/>
+                                          <p:spTgt spid="2"/>
                                         </p:tgtEl>
                                         <p:attrNameLst>
                                           <p:attrName>ppt_y</p:attrName>

</xml_diff>

<commit_message>
added initial aspNetCoreMvc files with individual authentication
</commit_message>
<xml_diff>
--- a/NilamHut.pptx
+++ b/NilamHut.pptx
@@ -1121,320 +1121,6 @@
       <dsp:cNvGrpSpPr/>
     </dsp:nvGrpSpPr>
     <dsp:grpSpPr/>
-    <dsp:sp modelId="{073C0186-C529-47F6-9A3F-AC54F3EC1A71}">
-      <dsp:nvSpPr>
-        <dsp:cNvPr id="0" name=""/>
-        <dsp:cNvSpPr/>
-      </dsp:nvSpPr>
-      <dsp:spPr>
-        <a:xfrm>
-          <a:off x="0" y="192658"/>
-          <a:ext cx="2253538" cy="2253506"/>
-        </a:xfrm>
-        <a:prstGeom prst="ellipse">
-          <a:avLst/>
-        </a:prstGeom>
-        <a:gradFill rotWithShape="0">
-          <a:gsLst>
-            <a:gs pos="0">
-              <a:schemeClr val="accent2">
-                <a:alpha val="50000"/>
-                <a:hueOff val="0"/>
-                <a:satOff val="0"/>
-                <a:lumOff val="0"/>
-                <a:alphaOff val="0"/>
-                <a:satMod val="103000"/>
-                <a:lumMod val="102000"/>
-                <a:tint val="94000"/>
-              </a:schemeClr>
-            </a:gs>
-            <a:gs pos="50000">
-              <a:schemeClr val="accent2">
-                <a:alpha val="50000"/>
-                <a:hueOff val="0"/>
-                <a:satOff val="0"/>
-                <a:lumOff val="0"/>
-                <a:alphaOff val="0"/>
-                <a:satMod val="110000"/>
-                <a:lumMod val="100000"/>
-                <a:shade val="100000"/>
-              </a:schemeClr>
-            </a:gs>
-            <a:gs pos="100000">
-              <a:schemeClr val="accent2">
-                <a:alpha val="50000"/>
-                <a:hueOff val="0"/>
-                <a:satOff val="0"/>
-                <a:lumOff val="0"/>
-                <a:alphaOff val="0"/>
-                <a:lumMod val="99000"/>
-                <a:satMod val="120000"/>
-                <a:shade val="78000"/>
-              </a:schemeClr>
-            </a:gs>
-          </a:gsLst>
-          <a:lin ang="5400000" scaled="0"/>
-        </a:gradFill>
-        <a:ln>
-          <a:noFill/>
-        </a:ln>
-        <a:effectLst/>
-      </dsp:spPr>
-      <dsp:style>
-        <a:lnRef idx="0">
-          <a:scrgbClr r="0" g="0" b="0"/>
-        </a:lnRef>
-        <a:fillRef idx="3">
-          <a:scrgbClr r="0" g="0" b="0"/>
-        </a:fillRef>
-        <a:effectRef idx="0">
-          <a:scrgbClr r="0" g="0" b="0"/>
-        </a:effectRef>
-        <a:fontRef idx="minor">
-          <a:schemeClr val="tx1"/>
-        </a:fontRef>
-      </dsp:style>
-      <dsp:txBody>
-        <a:bodyPr spcFirstLastPara="0" vert="horz" wrap="square" lIns="68580" tIns="68580" rIns="68580" bIns="68580" numCol="1" spcCol="1270" anchor="ctr" anchorCtr="0">
-          <a:noAutofit/>
-        </a:bodyPr>
-        <a:lstStyle/>
-        <a:p>
-          <a:pPr lvl="0" algn="ctr" defTabSz="800100">
-            <a:lnSpc>
-              <a:spcPct val="90000"/>
-            </a:lnSpc>
-            <a:spcBef>
-              <a:spcPct val="0"/>
-            </a:spcBef>
-            <a:spcAft>
-              <a:spcPct val="35000"/>
-            </a:spcAft>
-          </a:pPr>
-          <a:r>
-            <a:rPr lang="en-US" sz="1800" kern="1200" dirty="0" smtClean="0"/>
-            <a:t>Asp.net core is very recent technology. So community help is limited</a:t>
-          </a:r>
-          <a:endParaRPr lang="en-US" sz="1800" kern="1200" dirty="0"/>
-        </a:p>
-      </dsp:txBody>
-      <dsp:txXfrm>
-        <a:off x="330023" y="522676"/>
-        <a:ext cx="1593492" cy="1593470"/>
-      </dsp:txXfrm>
-    </dsp:sp>
-    <dsp:sp modelId="{B34614A2-1392-4E77-BDA0-2BEA4D89C2F7}">
-      <dsp:nvSpPr>
-        <dsp:cNvPr id="0" name=""/>
-        <dsp:cNvSpPr/>
-      </dsp:nvSpPr>
-      <dsp:spPr>
-        <a:xfrm>
-          <a:off x="1159916" y="1695622"/>
-          <a:ext cx="2253538" cy="2253506"/>
-        </a:xfrm>
-        <a:prstGeom prst="ellipse">
-          <a:avLst/>
-        </a:prstGeom>
-        <a:gradFill rotWithShape="0">
-          <a:gsLst>
-            <a:gs pos="0">
-              <a:schemeClr val="accent2">
-                <a:alpha val="50000"/>
-                <a:hueOff val="0"/>
-                <a:satOff val="0"/>
-                <a:lumOff val="0"/>
-                <a:alphaOff val="0"/>
-                <a:satMod val="103000"/>
-                <a:lumMod val="102000"/>
-                <a:tint val="94000"/>
-              </a:schemeClr>
-            </a:gs>
-            <a:gs pos="50000">
-              <a:schemeClr val="accent2">
-                <a:alpha val="50000"/>
-                <a:hueOff val="0"/>
-                <a:satOff val="0"/>
-                <a:lumOff val="0"/>
-                <a:alphaOff val="0"/>
-                <a:satMod val="110000"/>
-                <a:lumMod val="100000"/>
-                <a:shade val="100000"/>
-              </a:schemeClr>
-            </a:gs>
-            <a:gs pos="100000">
-              <a:schemeClr val="accent2">
-                <a:alpha val="50000"/>
-                <a:hueOff val="0"/>
-                <a:satOff val="0"/>
-                <a:lumOff val="0"/>
-                <a:alphaOff val="0"/>
-                <a:lumMod val="99000"/>
-                <a:satMod val="120000"/>
-                <a:shade val="78000"/>
-              </a:schemeClr>
-            </a:gs>
-          </a:gsLst>
-          <a:lin ang="5400000" scaled="0"/>
-        </a:gradFill>
-        <a:ln>
-          <a:noFill/>
-        </a:ln>
-        <a:effectLst/>
-      </dsp:spPr>
-      <dsp:style>
-        <a:lnRef idx="0">
-          <a:scrgbClr r="0" g="0" b="0"/>
-        </a:lnRef>
-        <a:fillRef idx="3">
-          <a:scrgbClr r="0" g="0" b="0"/>
-        </a:fillRef>
-        <a:effectRef idx="0">
-          <a:scrgbClr r="0" g="0" b="0"/>
-        </a:effectRef>
-        <a:fontRef idx="minor">
-          <a:schemeClr val="tx1"/>
-        </a:fontRef>
-      </dsp:style>
-      <dsp:txBody>
-        <a:bodyPr spcFirstLastPara="0" vert="horz" wrap="square" lIns="68580" tIns="68580" rIns="68580" bIns="68580" numCol="1" spcCol="1270" anchor="ctr" anchorCtr="0">
-          <a:noAutofit/>
-        </a:bodyPr>
-        <a:lstStyle/>
-        <a:p>
-          <a:pPr lvl="0" algn="ctr" defTabSz="800100">
-            <a:lnSpc>
-              <a:spcPct val="90000"/>
-            </a:lnSpc>
-            <a:spcBef>
-              <a:spcPct val="0"/>
-            </a:spcBef>
-            <a:spcAft>
-              <a:spcPct val="35000"/>
-            </a:spcAft>
-          </a:pPr>
-          <a:r>
-            <a:rPr lang="en-US" sz="1800" kern="1200" dirty="0" smtClean="0"/>
-            <a:t>Implementing secure transaction is challenging</a:t>
-          </a:r>
-          <a:endParaRPr lang="en-US" sz="1800" kern="1200" dirty="0"/>
-        </a:p>
-      </dsp:txBody>
-      <dsp:txXfrm>
-        <a:off x="1489939" y="2025640"/>
-        <a:ext cx="1593492" cy="1593470"/>
-      </dsp:txXfrm>
-    </dsp:sp>
-    <dsp:sp modelId="{2D81501D-F97C-4215-9373-9F01E07C91FE}">
-      <dsp:nvSpPr>
-        <dsp:cNvPr id="0" name=""/>
-        <dsp:cNvSpPr/>
-      </dsp:nvSpPr>
-      <dsp:spPr>
-        <a:xfrm>
-          <a:off x="2318461" y="192658"/>
-          <a:ext cx="2253538" cy="2253506"/>
-        </a:xfrm>
-        <a:prstGeom prst="ellipse">
-          <a:avLst/>
-        </a:prstGeom>
-        <a:gradFill rotWithShape="0">
-          <a:gsLst>
-            <a:gs pos="0">
-              <a:schemeClr val="accent2">
-                <a:alpha val="50000"/>
-                <a:hueOff val="0"/>
-                <a:satOff val="0"/>
-                <a:lumOff val="0"/>
-                <a:alphaOff val="0"/>
-                <a:satMod val="103000"/>
-                <a:lumMod val="102000"/>
-                <a:tint val="94000"/>
-              </a:schemeClr>
-            </a:gs>
-            <a:gs pos="50000">
-              <a:schemeClr val="accent2">
-                <a:alpha val="50000"/>
-                <a:hueOff val="0"/>
-                <a:satOff val="0"/>
-                <a:lumOff val="0"/>
-                <a:alphaOff val="0"/>
-                <a:satMod val="110000"/>
-                <a:lumMod val="100000"/>
-                <a:shade val="100000"/>
-              </a:schemeClr>
-            </a:gs>
-            <a:gs pos="100000">
-              <a:schemeClr val="accent2">
-                <a:alpha val="50000"/>
-                <a:hueOff val="0"/>
-                <a:satOff val="0"/>
-                <a:lumOff val="0"/>
-                <a:alphaOff val="0"/>
-                <a:lumMod val="99000"/>
-                <a:satMod val="120000"/>
-                <a:shade val="78000"/>
-              </a:schemeClr>
-            </a:gs>
-          </a:gsLst>
-          <a:lin ang="5400000" scaled="0"/>
-        </a:gradFill>
-        <a:ln>
-          <a:noFill/>
-        </a:ln>
-        <a:effectLst/>
-      </dsp:spPr>
-      <dsp:style>
-        <a:lnRef idx="0">
-          <a:scrgbClr r="0" g="0" b="0"/>
-        </a:lnRef>
-        <a:fillRef idx="3">
-          <a:scrgbClr r="0" g="0" b="0"/>
-        </a:fillRef>
-        <a:effectRef idx="0">
-          <a:scrgbClr r="0" g="0" b="0"/>
-        </a:effectRef>
-        <a:fontRef idx="minor">
-          <a:schemeClr val="tx1"/>
-        </a:fontRef>
-      </dsp:style>
-      <dsp:txBody>
-        <a:bodyPr spcFirstLastPara="0" vert="horz" wrap="square" lIns="68580" tIns="68580" rIns="68580" bIns="68580" numCol="1" spcCol="1270" anchor="ctr" anchorCtr="0">
-          <a:noAutofit/>
-        </a:bodyPr>
-        <a:lstStyle/>
-        <a:p>
-          <a:pPr lvl="0" algn="ctr" defTabSz="800100">
-            <a:lnSpc>
-              <a:spcPct val="90000"/>
-            </a:lnSpc>
-            <a:spcBef>
-              <a:spcPct val="0"/>
-            </a:spcBef>
-            <a:spcAft>
-              <a:spcPct val="35000"/>
-            </a:spcAft>
-          </a:pPr>
-          <a:r>
-            <a:rPr lang="en-US" sz="1800" kern="1200" dirty="0" smtClean="0"/>
-            <a:t>Implementing </a:t>
-          </a:r>
-          <a:r>
-            <a:rPr lang="en-US" sz="1800" kern="1200" dirty="0" err="1" smtClean="0"/>
-            <a:t>WebRTC</a:t>
-          </a:r>
-          <a:r>
-            <a:rPr lang="en-US" sz="1800" kern="1200" dirty="0" smtClean="0"/>
-            <a:t> in challenging</a:t>
-          </a:r>
-          <a:endParaRPr lang="en-US" sz="1800" kern="1200" dirty="0"/>
-        </a:p>
-      </dsp:txBody>
-      <dsp:txXfrm>
-        <a:off x="2648484" y="522676"/>
-        <a:ext cx="1593492" cy="1593470"/>
-      </dsp:txXfrm>
-    </dsp:sp>
   </dsp:spTree>
 </dsp:drawing>
 </file>
@@ -3152,7 +2838,7 @@
           <a:p>
             <a:fld id="{DE71268B-8AC2-4239-8FAF-7C144C210720}" type="datetimeFigureOut">
               <a:rPr lang="en-US"/>
-              <a:t>2/12/2018</a:t>
+              <a:t>2/13/2018</a:t>
             </a:fld>
             <a:endParaRPr/>
           </a:p>
@@ -3317,7 +3003,7 @@
           <a:p>
             <a:fld id="{F5AD8362-6D63-40AC-BAA9-90C3AE6D5875}" type="datetimeFigureOut">
               <a:rPr lang="en-US"/>
-              <a:t>2/12/2018</a:t>
+              <a:t>2/13/2018</a:t>
             </a:fld>
             <a:endParaRPr/>
           </a:p>
@@ -4129,7 +3815,7 @@
           <a:p>
             <a:fld id="{5F4E5243-F52A-4D37-9694-EB26C6C31910}" type="datetime1">
               <a:rPr lang="en-US"/>
-              <a:t>2/12/2018</a:t>
+              <a:t>2/13/2018</a:t>
             </a:fld>
             <a:endParaRPr/>
           </a:p>
@@ -4325,7 +4011,7 @@
           <a:p>
             <a:fld id="{3A77B6E1-634A-48DC-9E8B-D894023267EF}" type="datetime1">
               <a:rPr lang="en-US"/>
-              <a:t>2/12/2018</a:t>
+              <a:t>2/13/2018</a:t>
             </a:fld>
             <a:endParaRPr/>
           </a:p>
@@ -4515,7 +4201,7 @@
           <a:p>
             <a:fld id="{7B2D3E9E-A95C-48F2-B4BF-A71542E0BE9A}" type="datetime1">
               <a:rPr lang="en-US"/>
-              <a:t>2/12/2018</a:t>
+              <a:t>2/13/2018</a:t>
             </a:fld>
             <a:endParaRPr/>
           </a:p>
@@ -4846,7 +4532,7 @@
           <a:p>
             <a:fld id="{A50F84E2-2D7A-43CF-AC90-352A289A783A}" type="datetime1">
               <a:rPr lang="en-US"/>
-              <a:t>2/12/2018</a:t>
+              <a:t>2/13/2018</a:t>
             </a:fld>
             <a:endParaRPr/>
           </a:p>
@@ -5154,7 +4840,7 @@
           <a:p>
             <a:fld id="{F12952B5-7A2F-4CC8-B7CE-9234E21C2837}" type="datetime1">
               <a:rPr lang="en-US"/>
-              <a:t>2/12/2018</a:t>
+              <a:t>2/13/2018</a:t>
             </a:fld>
             <a:endParaRPr/>
           </a:p>
@@ -5602,7 +5288,7 @@
           <a:p>
             <a:fld id="{CE1DA07A-9201-4B4B-BAF2-015AFA30F520}" type="datetime1">
               <a:rPr lang="en-US"/>
-              <a:t>2/12/2018</a:t>
+              <a:t>2/13/2018</a:t>
             </a:fld>
             <a:endParaRPr/>
           </a:p>
@@ -5736,7 +5422,7 @@
           <a:p>
             <a:fld id="{73D7E00A-486F-4252-8B1D-E32645521F49}" type="datetime1">
               <a:rPr lang="en-US"/>
-              <a:t>2/12/2018</a:t>
+              <a:t>2/13/2018</a:t>
             </a:fld>
             <a:endParaRPr/>
           </a:p>
@@ -5909,7 +5595,7 @@
           <a:p>
             <a:fld id="{8DDF5F92-E675-4B36-9A60-69A962A68675}" type="datetime1">
               <a:rPr lang="en-US"/>
-              <a:t>2/12/2018</a:t>
+              <a:t>2/13/2018</a:t>
             </a:fld>
             <a:endParaRPr/>
           </a:p>
@@ -6214,7 +5900,7 @@
           <a:p>
             <a:fld id="{AF6E2C9B-5FA2-460D-9BE7-B0812FC2A6FF}" type="datetime1">
               <a:rPr lang="en-US"/>
-              <a:t>2/12/2018</a:t>
+              <a:t>2/13/2018</a:t>
             </a:fld>
             <a:endParaRPr/>
           </a:p>
@@ -6504,7 +6190,7 @@
           <a:p>
             <a:fld id="{1D374940-A916-4C8B-9648-02A2D3898F9E}" type="datetime1">
               <a:rPr lang="en-US"/>
-              <a:t>2/12/2018</a:t>
+              <a:t>2/13/2018</a:t>
             </a:fld>
             <a:endParaRPr/>
           </a:p>
@@ -6951,7 +6637,7 @@
             <a:fld id="{5586B75A-687E-405C-8A0B-8D00578BA2C3}" type="datetime1">
               <a:rPr lang="en-US" smtClean="0"/>
               <a:pPr/>
-              <a:t>2/12/2018</a:t>
+              <a:t>2/13/2018</a:t>
             </a:fld>
             <a:endParaRPr lang="en-US"/>
           </a:p>
@@ -12480,7 +12166,7 @@
         <p:spPr/>
         <p:txBody>
           <a:bodyPr>
-            <a:normAutofit lnSpcReduction="10000"/>
+            <a:normAutofit fontScale="92500" lnSpcReduction="10000"/>
           </a:bodyPr>
           <a:lstStyle/>
           <a:p>
@@ -12495,15 +12181,19 @@
             <a:pPr lvl="1"/>
             <a:r>
               <a:rPr lang="en-US" dirty="0"/>
-              <a:t>We have experience in </a:t>
-            </a:r>
-            <a:r>
-              <a:rPr lang="en-US" dirty="0" err="1"/>
-              <a:t>ASP.Net</a:t>
+              <a:t>We have experience </a:t>
+            </a:r>
+            <a:r>
+              <a:rPr lang="en-US"/>
+              <a:t>in </a:t>
+            </a:r>
+            <a:r>
+              <a:rPr lang="en-US" smtClean="0"/>
+              <a:t>ASP.NET </a:t>
             </a:r>
             <a:r>
               <a:rPr lang="en-US" dirty="0"/>
-              <a:t> Core on backend and Angular on front end.</a:t>
+              <a:t>Core on backend and Angular on front end.</a:t>
             </a:r>
             <a:endParaRPr lang="en-US" sz="1200" dirty="0"/>
           </a:p>
@@ -12511,9 +12201,24 @@
             <a:pPr lvl="1"/>
             <a:r>
               <a:rPr lang="en-US" dirty="0"/>
-              <a:t>We have also experience on web RTC for real time communication.</a:t>
-            </a:r>
-            <a:endParaRPr lang="en-US" sz="1200" dirty="0"/>
+              <a:t>We have also experience on web RTC for real time communication</a:t>
+            </a:r>
+            <a:r>
+              <a:rPr lang="en-US" dirty="0" smtClean="0"/>
+              <a:t>.</a:t>
+            </a:r>
+          </a:p>
+          <a:p>
+            <a:pPr lvl="1"/>
+            <a:r>
+              <a:rPr lang="en-US" dirty="0"/>
+              <a:t>User can use the browser from mobile, tablet or pc to browse our web site. All modern browsers are capable of running this </a:t>
+            </a:r>
+            <a:r>
+              <a:rPr lang="en-US" dirty="0" smtClean="0"/>
+              <a:t>site.</a:t>
+            </a:r>
+            <a:endParaRPr lang="en-US" dirty="0"/>
           </a:p>
           <a:p>
             <a:pPr lvl="0"/>
@@ -12936,6 +12641,103 @@
                                   </p:childTnLst>
                                 </p:cTn>
                               </p:par>
+                              <p:par>
+                                <p:cTn id="20" presetID="42" presetClass="entr" presetSubtype="0" fill="hold" grpId="0" nodeType="withEffect">
+                                  <p:stCondLst>
+                                    <p:cond delay="0"/>
+                                  </p:stCondLst>
+                                  <p:childTnLst>
+                                    <p:set>
+                                      <p:cBhvr>
+                                        <p:cTn id="21" dur="1" fill="hold">
+                                          <p:stCondLst>
+                                            <p:cond delay="0"/>
+                                          </p:stCondLst>
+                                        </p:cTn>
+                                        <p:tgtEl>
+                                          <p:spTgt spid="8">
+                                            <p:txEl>
+                                              <p:pRg st="3" end="3"/>
+                                            </p:txEl>
+                                          </p:spTgt>
+                                        </p:tgtEl>
+                                        <p:attrNameLst>
+                                          <p:attrName>style.visibility</p:attrName>
+                                        </p:attrNameLst>
+                                      </p:cBhvr>
+                                      <p:to>
+                                        <p:strVal val="visible"/>
+                                      </p:to>
+                                    </p:set>
+                                    <p:animEffect transition="in" filter="fade">
+                                      <p:cBhvr>
+                                        <p:cTn id="22" dur="1000"/>
+                                        <p:tgtEl>
+                                          <p:spTgt spid="8">
+                                            <p:txEl>
+                                              <p:pRg st="3" end="3"/>
+                                            </p:txEl>
+                                          </p:spTgt>
+                                        </p:tgtEl>
+                                      </p:cBhvr>
+                                    </p:animEffect>
+                                    <p:anim calcmode="lin" valueType="num">
+                                      <p:cBhvr>
+                                        <p:cTn id="23" dur="1000" fill="hold"/>
+                                        <p:tgtEl>
+                                          <p:spTgt spid="8">
+                                            <p:txEl>
+                                              <p:pRg st="3" end="3"/>
+                                            </p:txEl>
+                                          </p:spTgt>
+                                        </p:tgtEl>
+                                        <p:attrNameLst>
+                                          <p:attrName>ppt_x</p:attrName>
+                                        </p:attrNameLst>
+                                      </p:cBhvr>
+                                      <p:tavLst>
+                                        <p:tav tm="0">
+                                          <p:val>
+                                            <p:strVal val="#ppt_x"/>
+                                          </p:val>
+                                        </p:tav>
+                                        <p:tav tm="100000">
+                                          <p:val>
+                                            <p:strVal val="#ppt_x"/>
+                                          </p:val>
+                                        </p:tav>
+                                      </p:tavLst>
+                                    </p:anim>
+                                    <p:anim calcmode="lin" valueType="num">
+                                      <p:cBhvr>
+                                        <p:cTn id="24" dur="1000" fill="hold"/>
+                                        <p:tgtEl>
+                                          <p:spTgt spid="8">
+                                            <p:txEl>
+                                              <p:pRg st="3" end="3"/>
+                                            </p:txEl>
+                                          </p:spTgt>
+                                        </p:tgtEl>
+                                        <p:attrNameLst>
+                                          <p:attrName>ppt_y</p:attrName>
+                                        </p:attrNameLst>
+                                      </p:cBhvr>
+                                      <p:tavLst>
+                                        <p:tav tm="0">
+                                          <p:val>
+                                            <p:strVal val="#ppt_y+.1"/>
+                                          </p:val>
+                                        </p:tav>
+                                        <p:tav tm="100000">
+                                          <p:val>
+                                            <p:strVal val="#ppt_y"/>
+                                          </p:val>
+                                        </p:tav>
+                                      </p:tavLst>
+                                    </p:anim>
+                                  </p:childTnLst>
+                                </p:cTn>
+                              </p:par>
                             </p:childTnLst>
                           </p:cTn>
                         </p:par>
@@ -12943,116 +12745,19 @@
                     </p:cTn>
                   </p:par>
                   <p:par>
-                    <p:cTn id="20" fill="hold">
+                    <p:cTn id="25" fill="hold">
                       <p:stCondLst>
                         <p:cond delay="indefinite"/>
                       </p:stCondLst>
                       <p:childTnLst>
                         <p:par>
-                          <p:cTn id="21" fill="hold">
+                          <p:cTn id="26" fill="hold">
                             <p:stCondLst>
                               <p:cond delay="0"/>
                             </p:stCondLst>
                             <p:childTnLst>
                               <p:par>
-                                <p:cTn id="22" presetID="42" presetClass="entr" presetSubtype="0" fill="hold" grpId="0" nodeType="clickEffect">
-                                  <p:stCondLst>
-                                    <p:cond delay="0"/>
-                                  </p:stCondLst>
-                                  <p:childTnLst>
-                                    <p:set>
-                                      <p:cBhvr>
-                                        <p:cTn id="23" dur="1" fill="hold">
-                                          <p:stCondLst>
-                                            <p:cond delay="0"/>
-                                          </p:stCondLst>
-                                        </p:cTn>
-                                        <p:tgtEl>
-                                          <p:spTgt spid="8">
-                                            <p:txEl>
-                                              <p:pRg st="3" end="3"/>
-                                            </p:txEl>
-                                          </p:spTgt>
-                                        </p:tgtEl>
-                                        <p:attrNameLst>
-                                          <p:attrName>style.visibility</p:attrName>
-                                        </p:attrNameLst>
-                                      </p:cBhvr>
-                                      <p:to>
-                                        <p:strVal val="visible"/>
-                                      </p:to>
-                                    </p:set>
-                                    <p:animEffect transition="in" filter="fade">
-                                      <p:cBhvr>
-                                        <p:cTn id="24" dur="1000"/>
-                                        <p:tgtEl>
-                                          <p:spTgt spid="8">
-                                            <p:txEl>
-                                              <p:pRg st="3" end="3"/>
-                                            </p:txEl>
-                                          </p:spTgt>
-                                        </p:tgtEl>
-                                      </p:cBhvr>
-                                    </p:animEffect>
-                                    <p:anim calcmode="lin" valueType="num">
-                                      <p:cBhvr>
-                                        <p:cTn id="25" dur="1000" fill="hold"/>
-                                        <p:tgtEl>
-                                          <p:spTgt spid="8">
-                                            <p:txEl>
-                                              <p:pRg st="3" end="3"/>
-                                            </p:txEl>
-                                          </p:spTgt>
-                                        </p:tgtEl>
-                                        <p:attrNameLst>
-                                          <p:attrName>ppt_x</p:attrName>
-                                        </p:attrNameLst>
-                                      </p:cBhvr>
-                                      <p:tavLst>
-                                        <p:tav tm="0">
-                                          <p:val>
-                                            <p:strVal val="#ppt_x"/>
-                                          </p:val>
-                                        </p:tav>
-                                        <p:tav tm="100000">
-                                          <p:val>
-                                            <p:strVal val="#ppt_x"/>
-                                          </p:val>
-                                        </p:tav>
-                                      </p:tavLst>
-                                    </p:anim>
-                                    <p:anim calcmode="lin" valueType="num">
-                                      <p:cBhvr>
-                                        <p:cTn id="26" dur="1000" fill="hold"/>
-                                        <p:tgtEl>
-                                          <p:spTgt spid="8">
-                                            <p:txEl>
-                                              <p:pRg st="3" end="3"/>
-                                            </p:txEl>
-                                          </p:spTgt>
-                                        </p:tgtEl>
-                                        <p:attrNameLst>
-                                          <p:attrName>ppt_y</p:attrName>
-                                        </p:attrNameLst>
-                                      </p:cBhvr>
-                                      <p:tavLst>
-                                        <p:tav tm="0">
-                                          <p:val>
-                                            <p:strVal val="#ppt_y+.1"/>
-                                          </p:val>
-                                        </p:tav>
-                                        <p:tav tm="100000">
-                                          <p:val>
-                                            <p:strVal val="#ppt_y"/>
-                                          </p:val>
-                                        </p:tav>
-                                      </p:tavLst>
-                                    </p:anim>
-                                  </p:childTnLst>
-                                </p:cTn>
-                              </p:par>
-                              <p:par>
-                                <p:cTn id="27" presetID="42" presetClass="entr" presetSubtype="0" fill="hold" grpId="0" nodeType="withEffect">
+                                <p:cTn id="27" presetID="42" presetClass="entr" presetSubtype="0" fill="hold" grpId="0" nodeType="clickEffect">
                                   <p:stCondLst>
                                     <p:cond delay="0"/>
                                   </p:stCondLst>
@@ -13342,6 +13047,103 @@
                                   </p:childTnLst>
                                 </p:cTn>
                               </p:par>
+                              <p:par>
+                                <p:cTn id="42" presetID="42" presetClass="entr" presetSubtype="0" fill="hold" grpId="0" nodeType="withEffect">
+                                  <p:stCondLst>
+                                    <p:cond delay="0"/>
+                                  </p:stCondLst>
+                                  <p:childTnLst>
+                                    <p:set>
+                                      <p:cBhvr>
+                                        <p:cTn id="43" dur="1" fill="hold">
+                                          <p:stCondLst>
+                                            <p:cond delay="0"/>
+                                          </p:stCondLst>
+                                        </p:cTn>
+                                        <p:tgtEl>
+                                          <p:spTgt spid="8">
+                                            <p:txEl>
+                                              <p:pRg st="7" end="7"/>
+                                            </p:txEl>
+                                          </p:spTgt>
+                                        </p:tgtEl>
+                                        <p:attrNameLst>
+                                          <p:attrName>style.visibility</p:attrName>
+                                        </p:attrNameLst>
+                                      </p:cBhvr>
+                                      <p:to>
+                                        <p:strVal val="visible"/>
+                                      </p:to>
+                                    </p:set>
+                                    <p:animEffect transition="in" filter="fade">
+                                      <p:cBhvr>
+                                        <p:cTn id="44" dur="1000"/>
+                                        <p:tgtEl>
+                                          <p:spTgt spid="8">
+                                            <p:txEl>
+                                              <p:pRg st="7" end="7"/>
+                                            </p:txEl>
+                                          </p:spTgt>
+                                        </p:tgtEl>
+                                      </p:cBhvr>
+                                    </p:animEffect>
+                                    <p:anim calcmode="lin" valueType="num">
+                                      <p:cBhvr>
+                                        <p:cTn id="45" dur="1000" fill="hold"/>
+                                        <p:tgtEl>
+                                          <p:spTgt spid="8">
+                                            <p:txEl>
+                                              <p:pRg st="7" end="7"/>
+                                            </p:txEl>
+                                          </p:spTgt>
+                                        </p:tgtEl>
+                                        <p:attrNameLst>
+                                          <p:attrName>ppt_x</p:attrName>
+                                        </p:attrNameLst>
+                                      </p:cBhvr>
+                                      <p:tavLst>
+                                        <p:tav tm="0">
+                                          <p:val>
+                                            <p:strVal val="#ppt_x"/>
+                                          </p:val>
+                                        </p:tav>
+                                        <p:tav tm="100000">
+                                          <p:val>
+                                            <p:strVal val="#ppt_x"/>
+                                          </p:val>
+                                        </p:tav>
+                                      </p:tavLst>
+                                    </p:anim>
+                                    <p:anim calcmode="lin" valueType="num">
+                                      <p:cBhvr>
+                                        <p:cTn id="46" dur="1000" fill="hold"/>
+                                        <p:tgtEl>
+                                          <p:spTgt spid="8">
+                                            <p:txEl>
+                                              <p:pRg st="7" end="7"/>
+                                            </p:txEl>
+                                          </p:spTgt>
+                                        </p:tgtEl>
+                                        <p:attrNameLst>
+                                          <p:attrName>ppt_y</p:attrName>
+                                        </p:attrNameLst>
+                                      </p:cBhvr>
+                                      <p:tavLst>
+                                        <p:tav tm="0">
+                                          <p:val>
+                                            <p:strVal val="#ppt_y+.1"/>
+                                          </p:val>
+                                        </p:tav>
+                                        <p:tav tm="100000">
+                                          <p:val>
+                                            <p:strVal val="#ppt_y"/>
+                                          </p:val>
+                                        </p:tav>
+                                      </p:tavLst>
+                                    </p:anim>
+                                  </p:childTnLst>
+                                </p:cTn>
+                              </p:par>
                             </p:childTnLst>
                           </p:cTn>
                         </p:par>
@@ -13349,116 +13151,19 @@
                     </p:cTn>
                   </p:par>
                   <p:par>
-                    <p:cTn id="42" fill="hold">
+                    <p:cTn id="47" fill="hold">
                       <p:stCondLst>
                         <p:cond delay="indefinite"/>
                       </p:stCondLst>
                       <p:childTnLst>
                         <p:par>
-                          <p:cTn id="43" fill="hold">
+                          <p:cTn id="48" fill="hold">
                             <p:stCondLst>
                               <p:cond delay="0"/>
                             </p:stCondLst>
                             <p:childTnLst>
                               <p:par>
-                                <p:cTn id="44" presetID="42" presetClass="entr" presetSubtype="0" fill="hold" grpId="0" nodeType="clickEffect">
-                                  <p:stCondLst>
-                                    <p:cond delay="0"/>
-                                  </p:stCondLst>
-                                  <p:childTnLst>
-                                    <p:set>
-                                      <p:cBhvr>
-                                        <p:cTn id="45" dur="1" fill="hold">
-                                          <p:stCondLst>
-                                            <p:cond delay="0"/>
-                                          </p:stCondLst>
-                                        </p:cTn>
-                                        <p:tgtEl>
-                                          <p:spTgt spid="8">
-                                            <p:txEl>
-                                              <p:pRg st="7" end="7"/>
-                                            </p:txEl>
-                                          </p:spTgt>
-                                        </p:tgtEl>
-                                        <p:attrNameLst>
-                                          <p:attrName>style.visibility</p:attrName>
-                                        </p:attrNameLst>
-                                      </p:cBhvr>
-                                      <p:to>
-                                        <p:strVal val="visible"/>
-                                      </p:to>
-                                    </p:set>
-                                    <p:animEffect transition="in" filter="fade">
-                                      <p:cBhvr>
-                                        <p:cTn id="46" dur="1000"/>
-                                        <p:tgtEl>
-                                          <p:spTgt spid="8">
-                                            <p:txEl>
-                                              <p:pRg st="7" end="7"/>
-                                            </p:txEl>
-                                          </p:spTgt>
-                                        </p:tgtEl>
-                                      </p:cBhvr>
-                                    </p:animEffect>
-                                    <p:anim calcmode="lin" valueType="num">
-                                      <p:cBhvr>
-                                        <p:cTn id="47" dur="1000" fill="hold"/>
-                                        <p:tgtEl>
-                                          <p:spTgt spid="8">
-                                            <p:txEl>
-                                              <p:pRg st="7" end="7"/>
-                                            </p:txEl>
-                                          </p:spTgt>
-                                        </p:tgtEl>
-                                        <p:attrNameLst>
-                                          <p:attrName>ppt_x</p:attrName>
-                                        </p:attrNameLst>
-                                      </p:cBhvr>
-                                      <p:tavLst>
-                                        <p:tav tm="0">
-                                          <p:val>
-                                            <p:strVal val="#ppt_x"/>
-                                          </p:val>
-                                        </p:tav>
-                                        <p:tav tm="100000">
-                                          <p:val>
-                                            <p:strVal val="#ppt_x"/>
-                                          </p:val>
-                                        </p:tav>
-                                      </p:tavLst>
-                                    </p:anim>
-                                    <p:anim calcmode="lin" valueType="num">
-                                      <p:cBhvr>
-                                        <p:cTn id="48" dur="1000" fill="hold"/>
-                                        <p:tgtEl>
-                                          <p:spTgt spid="8">
-                                            <p:txEl>
-                                              <p:pRg st="7" end="7"/>
-                                            </p:txEl>
-                                          </p:spTgt>
-                                        </p:tgtEl>
-                                        <p:attrNameLst>
-                                          <p:attrName>ppt_y</p:attrName>
-                                        </p:attrNameLst>
-                                      </p:cBhvr>
-                                      <p:tavLst>
-                                        <p:tav tm="0">
-                                          <p:val>
-                                            <p:strVal val="#ppt_y+.1"/>
-                                          </p:val>
-                                        </p:tav>
-                                        <p:tav tm="100000">
-                                          <p:val>
-                                            <p:strVal val="#ppt_y"/>
-                                          </p:val>
-                                        </p:tav>
-                                      </p:tavLst>
-                                    </p:anim>
-                                  </p:childTnLst>
-                                </p:cTn>
-                              </p:par>
-                              <p:par>
-                                <p:cTn id="49" presetID="42" presetClass="entr" presetSubtype="0" fill="hold" grpId="0" nodeType="withEffect">
+                                <p:cTn id="49" presetID="42" presetClass="entr" presetSubtype="0" fill="hold" grpId="0" nodeType="clickEffect">
                                   <p:stCondLst>
                                     <p:cond delay="0"/>
                                   </p:stCondLst>
@@ -13628,6 +13333,103 @@
                                           <p:spTgt spid="8">
                                             <p:txEl>
                                               <p:pRg st="9" end="9"/>
+                                            </p:txEl>
+                                          </p:spTgt>
+                                        </p:tgtEl>
+                                        <p:attrNameLst>
+                                          <p:attrName>ppt_y</p:attrName>
+                                        </p:attrNameLst>
+                                      </p:cBhvr>
+                                      <p:tavLst>
+                                        <p:tav tm="0">
+                                          <p:val>
+                                            <p:strVal val="#ppt_y+.1"/>
+                                          </p:val>
+                                        </p:tav>
+                                        <p:tav tm="100000">
+                                          <p:val>
+                                            <p:strVal val="#ppt_y"/>
+                                          </p:val>
+                                        </p:tav>
+                                      </p:tavLst>
+                                    </p:anim>
+                                  </p:childTnLst>
+                                </p:cTn>
+                              </p:par>
+                              <p:par>
+                                <p:cTn id="59" presetID="42" presetClass="entr" presetSubtype="0" fill="hold" grpId="0" nodeType="withEffect">
+                                  <p:stCondLst>
+                                    <p:cond delay="0"/>
+                                  </p:stCondLst>
+                                  <p:childTnLst>
+                                    <p:set>
+                                      <p:cBhvr>
+                                        <p:cTn id="60" dur="1" fill="hold">
+                                          <p:stCondLst>
+                                            <p:cond delay="0"/>
+                                          </p:stCondLst>
+                                        </p:cTn>
+                                        <p:tgtEl>
+                                          <p:spTgt spid="8">
+                                            <p:txEl>
+                                              <p:pRg st="10" end="10"/>
+                                            </p:txEl>
+                                          </p:spTgt>
+                                        </p:tgtEl>
+                                        <p:attrNameLst>
+                                          <p:attrName>style.visibility</p:attrName>
+                                        </p:attrNameLst>
+                                      </p:cBhvr>
+                                      <p:to>
+                                        <p:strVal val="visible"/>
+                                      </p:to>
+                                    </p:set>
+                                    <p:animEffect transition="in" filter="fade">
+                                      <p:cBhvr>
+                                        <p:cTn id="61" dur="1000"/>
+                                        <p:tgtEl>
+                                          <p:spTgt spid="8">
+                                            <p:txEl>
+                                              <p:pRg st="10" end="10"/>
+                                            </p:txEl>
+                                          </p:spTgt>
+                                        </p:tgtEl>
+                                      </p:cBhvr>
+                                    </p:animEffect>
+                                    <p:anim calcmode="lin" valueType="num">
+                                      <p:cBhvr>
+                                        <p:cTn id="62" dur="1000" fill="hold"/>
+                                        <p:tgtEl>
+                                          <p:spTgt spid="8">
+                                            <p:txEl>
+                                              <p:pRg st="10" end="10"/>
+                                            </p:txEl>
+                                          </p:spTgt>
+                                        </p:tgtEl>
+                                        <p:attrNameLst>
+                                          <p:attrName>ppt_x</p:attrName>
+                                        </p:attrNameLst>
+                                      </p:cBhvr>
+                                      <p:tavLst>
+                                        <p:tav tm="0">
+                                          <p:val>
+                                            <p:strVal val="#ppt_x"/>
+                                          </p:val>
+                                        </p:tav>
+                                        <p:tav tm="100000">
+                                          <p:val>
+                                            <p:strVal val="#ppt_x"/>
+                                          </p:val>
+                                        </p:tav>
+                                      </p:tavLst>
+                                    </p:anim>
+                                    <p:anim calcmode="lin" valueType="num">
+                                      <p:cBhvr>
+                                        <p:cTn id="63" dur="1000" fill="hold"/>
+                                        <p:tgtEl>
+                                          <p:spTgt spid="8">
+                                            <p:txEl>
+                                              <p:pRg st="10" end="10"/>
                                             </p:txEl>
                                           </p:spTgt>
                                         </p:tgtEl>

</xml_diff>